<commit_message>
added quicksight charts for standardization
</commit_message>
<xml_diff>
--- a/public/Exam Notes/1-Introduction - Data Engineering.pptx
+++ b/public/Exam Notes/1-Introduction - Data Engineering.pptx
@@ -1203,7 +1203,7 @@
   <p:cSld>
     <p:spTree>
       <p:nvGrpSpPr>
-        <p:cNvPr id="140" name="Shape 140"/>
+        <p:cNvPr id="133" name="Shape 133"/>
         <p:cNvGrpSpPr/>
         <p:nvPr/>
       </p:nvGrpSpPr>
@@ -1217,7 +1217,7 @@
       </p:grpSpPr>
       <p:sp>
         <p:nvSpPr>
-          <p:cNvPr id="141" name="Google Shape;141;g6c7e88301c_1_93:notes"/>
+          <p:cNvPr id="134" name="Google Shape;134;g6c7e88301c_1_93:notes"/>
           <p:cNvSpPr/>
           <p:nvPr>
             <p:ph idx="2" type="sldImg"/>
@@ -1252,7 +1252,7 @@
       </p:sp>
       <p:sp>
         <p:nvSpPr>
-          <p:cNvPr id="142" name="Google Shape;142;g6c7e88301c_1_93:notes"/>
+          <p:cNvPr id="135" name="Google Shape;135;g6c7e88301c_1_93:notes"/>
           <p:cNvSpPr txBox="1"/>
           <p:nvPr>
             <p:ph idx="1" type="body"/>
@@ -1302,7 +1302,7 @@
   <p:cSld>
     <p:spTree>
       <p:nvGrpSpPr>
-        <p:cNvPr id="154" name="Shape 154"/>
+        <p:cNvPr id="147" name="Shape 147"/>
         <p:cNvGrpSpPr/>
         <p:nvPr/>
       </p:nvGrpSpPr>
@@ -1316,7 +1316,7 @@
       </p:grpSpPr>
       <p:sp>
         <p:nvSpPr>
-          <p:cNvPr id="155" name="Google Shape;155;g6c7e88301c_1_113:notes"/>
+          <p:cNvPr id="148" name="Google Shape;148;g6c7e88301c_1_113:notes"/>
           <p:cNvSpPr/>
           <p:nvPr>
             <p:ph idx="2" type="sldImg"/>
@@ -1351,7 +1351,7 @@
       </p:sp>
       <p:sp>
         <p:nvSpPr>
-          <p:cNvPr id="156" name="Google Shape;156;g6c7e88301c_1_113:notes"/>
+          <p:cNvPr id="149" name="Google Shape;149;g6c7e88301c_1_113:notes"/>
           <p:cNvSpPr txBox="1"/>
           <p:nvPr>
             <p:ph idx="1" type="body"/>
@@ -1401,7 +1401,7 @@
   <p:cSld>
     <p:spTree>
       <p:nvGrpSpPr>
-        <p:cNvPr id="167" name="Shape 167"/>
+        <p:cNvPr id="160" name="Shape 160"/>
         <p:cNvGrpSpPr/>
         <p:nvPr/>
       </p:nvGrpSpPr>
@@ -1415,7 +1415,7 @@
       </p:grpSpPr>
       <p:sp>
         <p:nvSpPr>
-          <p:cNvPr id="168" name="Google Shape;168;g6c7e88301c_1_127:notes"/>
+          <p:cNvPr id="161" name="Google Shape;161;g6c7e88301c_1_127:notes"/>
           <p:cNvSpPr/>
           <p:nvPr>
             <p:ph idx="2" type="sldImg"/>
@@ -1450,7 +1450,7 @@
       </p:sp>
       <p:sp>
         <p:nvSpPr>
-          <p:cNvPr id="169" name="Google Shape;169;g6c7e88301c_1_127:notes"/>
+          <p:cNvPr id="162" name="Google Shape;162;g6c7e88301c_1_127:notes"/>
           <p:cNvSpPr txBox="1"/>
           <p:nvPr>
             <p:ph idx="1" type="body"/>
@@ -1500,7 +1500,7 @@
   <p:cSld>
     <p:spTree>
       <p:nvGrpSpPr>
-        <p:cNvPr id="188" name="Shape 188"/>
+        <p:cNvPr id="181" name="Shape 181"/>
         <p:cNvGrpSpPr/>
         <p:nvPr/>
       </p:nvGrpSpPr>
@@ -1514,7 +1514,7 @@
       </p:grpSpPr>
       <p:sp>
         <p:nvSpPr>
-          <p:cNvPr id="189" name="Google Shape;189;g6c7e88301c_1_155:notes"/>
+          <p:cNvPr id="182" name="Google Shape;182;g6c7e88301c_1_155:notes"/>
           <p:cNvSpPr/>
           <p:nvPr>
             <p:ph idx="2" type="sldImg"/>
@@ -1549,7 +1549,7 @@
       </p:sp>
       <p:sp>
         <p:nvSpPr>
-          <p:cNvPr id="190" name="Google Shape;190;g6c7e88301c_1_155:notes"/>
+          <p:cNvPr id="183" name="Google Shape;183;g6c7e88301c_1_155:notes"/>
           <p:cNvSpPr txBox="1"/>
           <p:nvPr>
             <p:ph idx="1" type="body"/>
@@ -7206,6 +7206,460 @@
   <p:clrMapOvr>
     <a:masterClrMapping/>
   </p:clrMapOvr>
+  <p:timing>
+    <p:tnLst>
+      <p:par>
+        <p:cTn dur="indefinite" nodeType="tmRoot" restart="never">
+          <p:childTnLst>
+            <p:seq concurrent="1" nextAc="seek">
+              <p:cTn dur="indefinite" id="2" nodeType="mainSeq">
+                <p:childTnLst>
+                  <p:par>
+                    <p:cTn fill="hold">
+                      <p:stCondLst>
+                        <p:cond delay="indefinite"/>
+                      </p:stCondLst>
+                      <p:childTnLst>
+                        <p:par>
+                          <p:cTn fill="hold">
+                            <p:stCondLst>
+                              <p:cond delay="0"/>
+                            </p:stCondLst>
+                            <p:childTnLst>
+                              <p:par>
+                                <p:cTn fill="hold" nodeType="clickEffect" presetClass="entr" presetID="10" presetSubtype="0">
+                                  <p:stCondLst>
+                                    <p:cond delay="0"/>
+                                  </p:stCondLst>
+                                  <p:childTnLst>
+                                    <p:set>
+                                      <p:cBhvr>
+                                        <p:cTn dur="1" fill="hold">
+                                          <p:stCondLst>
+                                            <p:cond delay="0"/>
+                                          </p:stCondLst>
+                                        </p:cTn>
+                                        <p:tgtEl>
+                                          <p:spTgt spid="69"/>
+                                        </p:tgtEl>
+                                        <p:attrNameLst>
+                                          <p:attrName>style.visibility</p:attrName>
+                                        </p:attrNameLst>
+                                      </p:cBhvr>
+                                      <p:to>
+                                        <p:strVal val="visible"/>
+                                      </p:to>
+                                    </p:set>
+                                    <p:animEffect filter="fade" transition="in">
+                                      <p:cBhvr>
+                                        <p:cTn dur="1000"/>
+                                        <p:tgtEl>
+                                          <p:spTgt spid="69"/>
+                                        </p:tgtEl>
+                                      </p:cBhvr>
+                                    </p:animEffect>
+                                  </p:childTnLst>
+                                </p:cTn>
+                              </p:par>
+                            </p:childTnLst>
+                          </p:cTn>
+                        </p:par>
+                      </p:childTnLst>
+                    </p:cTn>
+                  </p:par>
+                  <p:par>
+                    <p:cTn fill="hold">
+                      <p:stCondLst>
+                        <p:cond delay="indefinite"/>
+                      </p:stCondLst>
+                      <p:childTnLst>
+                        <p:par>
+                          <p:cTn fill="hold">
+                            <p:stCondLst>
+                              <p:cond delay="0"/>
+                            </p:stCondLst>
+                            <p:childTnLst>
+                              <p:par>
+                                <p:cTn fill="hold" nodeType="clickEffect" presetClass="entr" presetID="10" presetSubtype="0">
+                                  <p:stCondLst>
+                                    <p:cond delay="0"/>
+                                  </p:stCondLst>
+                                  <p:childTnLst>
+                                    <p:set>
+                                      <p:cBhvr>
+                                        <p:cTn dur="1" fill="hold">
+                                          <p:stCondLst>
+                                            <p:cond delay="0"/>
+                                          </p:stCondLst>
+                                        </p:cTn>
+                                        <p:tgtEl>
+                                          <p:spTgt spid="70"/>
+                                        </p:tgtEl>
+                                        <p:attrNameLst>
+                                          <p:attrName>style.visibility</p:attrName>
+                                        </p:attrNameLst>
+                                      </p:cBhvr>
+                                      <p:to>
+                                        <p:strVal val="visible"/>
+                                      </p:to>
+                                    </p:set>
+                                    <p:animEffect filter="fade" transition="in">
+                                      <p:cBhvr>
+                                        <p:cTn dur="1000"/>
+                                        <p:tgtEl>
+                                          <p:spTgt spid="70"/>
+                                        </p:tgtEl>
+                                      </p:cBhvr>
+                                    </p:animEffect>
+                                  </p:childTnLst>
+                                </p:cTn>
+                              </p:par>
+                            </p:childTnLst>
+                          </p:cTn>
+                        </p:par>
+                      </p:childTnLst>
+                    </p:cTn>
+                  </p:par>
+                  <p:par>
+                    <p:cTn fill="hold">
+                      <p:stCondLst>
+                        <p:cond delay="indefinite"/>
+                      </p:stCondLst>
+                      <p:childTnLst>
+                        <p:par>
+                          <p:cTn fill="hold">
+                            <p:stCondLst>
+                              <p:cond delay="0"/>
+                            </p:stCondLst>
+                            <p:childTnLst>
+                              <p:par>
+                                <p:cTn fill="hold" nodeType="clickEffect" presetClass="entr" presetID="10" presetSubtype="0">
+                                  <p:stCondLst>
+                                    <p:cond delay="0"/>
+                                  </p:stCondLst>
+                                  <p:childTnLst>
+                                    <p:set>
+                                      <p:cBhvr>
+                                        <p:cTn dur="1" fill="hold">
+                                          <p:stCondLst>
+                                            <p:cond delay="0"/>
+                                          </p:stCondLst>
+                                        </p:cTn>
+                                        <p:tgtEl>
+                                          <p:spTgt spid="71"/>
+                                        </p:tgtEl>
+                                        <p:attrNameLst>
+                                          <p:attrName>style.visibility</p:attrName>
+                                        </p:attrNameLst>
+                                      </p:cBhvr>
+                                      <p:to>
+                                        <p:strVal val="visible"/>
+                                      </p:to>
+                                    </p:set>
+                                    <p:animEffect filter="fade" transition="in">
+                                      <p:cBhvr>
+                                        <p:cTn dur="1000"/>
+                                        <p:tgtEl>
+                                          <p:spTgt spid="71"/>
+                                        </p:tgtEl>
+                                      </p:cBhvr>
+                                    </p:animEffect>
+                                  </p:childTnLst>
+                                </p:cTn>
+                              </p:par>
+                            </p:childTnLst>
+                          </p:cTn>
+                        </p:par>
+                      </p:childTnLst>
+                    </p:cTn>
+                  </p:par>
+                  <p:par>
+                    <p:cTn fill="hold">
+                      <p:stCondLst>
+                        <p:cond delay="indefinite"/>
+                      </p:stCondLst>
+                      <p:childTnLst>
+                        <p:par>
+                          <p:cTn fill="hold">
+                            <p:stCondLst>
+                              <p:cond delay="0"/>
+                            </p:stCondLst>
+                            <p:childTnLst>
+                              <p:par>
+                                <p:cTn fill="hold" nodeType="clickEffect" presetClass="entr" presetID="10" presetSubtype="0">
+                                  <p:stCondLst>
+                                    <p:cond delay="0"/>
+                                  </p:stCondLst>
+                                  <p:childTnLst>
+                                    <p:set>
+                                      <p:cBhvr>
+                                        <p:cTn dur="1" fill="hold">
+                                          <p:stCondLst>
+                                            <p:cond delay="0"/>
+                                          </p:stCondLst>
+                                        </p:cTn>
+                                        <p:tgtEl>
+                                          <p:spTgt spid="72"/>
+                                        </p:tgtEl>
+                                        <p:attrNameLst>
+                                          <p:attrName>style.visibility</p:attrName>
+                                        </p:attrNameLst>
+                                      </p:cBhvr>
+                                      <p:to>
+                                        <p:strVal val="visible"/>
+                                      </p:to>
+                                    </p:set>
+                                    <p:animEffect filter="fade" transition="in">
+                                      <p:cBhvr>
+                                        <p:cTn dur="1000"/>
+                                        <p:tgtEl>
+                                          <p:spTgt spid="72"/>
+                                        </p:tgtEl>
+                                      </p:cBhvr>
+                                    </p:animEffect>
+                                  </p:childTnLst>
+                                </p:cTn>
+                              </p:par>
+                            </p:childTnLst>
+                          </p:cTn>
+                        </p:par>
+                      </p:childTnLst>
+                    </p:cTn>
+                  </p:par>
+                  <p:par>
+                    <p:cTn fill="hold">
+                      <p:stCondLst>
+                        <p:cond delay="indefinite"/>
+                      </p:stCondLst>
+                      <p:childTnLst>
+                        <p:par>
+                          <p:cTn fill="hold">
+                            <p:stCondLst>
+                              <p:cond delay="0"/>
+                            </p:stCondLst>
+                            <p:childTnLst>
+                              <p:par>
+                                <p:cTn fill="hold" nodeType="clickEffect" presetClass="entr" presetID="10" presetSubtype="0">
+                                  <p:stCondLst>
+                                    <p:cond delay="0"/>
+                                  </p:stCondLst>
+                                  <p:childTnLst>
+                                    <p:set>
+                                      <p:cBhvr>
+                                        <p:cTn dur="1" fill="hold">
+                                          <p:stCondLst>
+                                            <p:cond delay="0"/>
+                                          </p:stCondLst>
+                                        </p:cTn>
+                                        <p:tgtEl>
+                                          <p:spTgt spid="73"/>
+                                        </p:tgtEl>
+                                        <p:attrNameLst>
+                                          <p:attrName>style.visibility</p:attrName>
+                                        </p:attrNameLst>
+                                      </p:cBhvr>
+                                      <p:to>
+                                        <p:strVal val="visible"/>
+                                      </p:to>
+                                    </p:set>
+                                    <p:animEffect filter="fade" transition="in">
+                                      <p:cBhvr>
+                                        <p:cTn dur="1000"/>
+                                        <p:tgtEl>
+                                          <p:spTgt spid="73"/>
+                                        </p:tgtEl>
+                                      </p:cBhvr>
+                                    </p:animEffect>
+                                  </p:childTnLst>
+                                </p:cTn>
+                              </p:par>
+                            </p:childTnLst>
+                          </p:cTn>
+                        </p:par>
+                      </p:childTnLst>
+                    </p:cTn>
+                  </p:par>
+                  <p:par>
+                    <p:cTn fill="hold">
+                      <p:stCondLst>
+                        <p:cond delay="indefinite"/>
+                      </p:stCondLst>
+                      <p:childTnLst>
+                        <p:par>
+                          <p:cTn fill="hold">
+                            <p:stCondLst>
+                              <p:cond delay="0"/>
+                            </p:stCondLst>
+                            <p:childTnLst>
+                              <p:par>
+                                <p:cTn fill="hold" nodeType="clickEffect" presetClass="entr" presetID="10" presetSubtype="0">
+                                  <p:stCondLst>
+                                    <p:cond delay="0"/>
+                                  </p:stCondLst>
+                                  <p:childTnLst>
+                                    <p:set>
+                                      <p:cBhvr>
+                                        <p:cTn dur="1" fill="hold">
+                                          <p:stCondLst>
+                                            <p:cond delay="0"/>
+                                          </p:stCondLst>
+                                        </p:cTn>
+                                        <p:tgtEl>
+                                          <p:spTgt spid="74"/>
+                                        </p:tgtEl>
+                                        <p:attrNameLst>
+                                          <p:attrName>style.visibility</p:attrName>
+                                        </p:attrNameLst>
+                                      </p:cBhvr>
+                                      <p:to>
+                                        <p:strVal val="visible"/>
+                                      </p:to>
+                                    </p:set>
+                                    <p:animEffect filter="fade" transition="in">
+                                      <p:cBhvr>
+                                        <p:cTn dur="1000"/>
+                                        <p:tgtEl>
+                                          <p:spTgt spid="74"/>
+                                        </p:tgtEl>
+                                      </p:cBhvr>
+                                    </p:animEffect>
+                                  </p:childTnLst>
+                                </p:cTn>
+                              </p:par>
+                            </p:childTnLst>
+                          </p:cTn>
+                        </p:par>
+                      </p:childTnLst>
+                    </p:cTn>
+                  </p:par>
+                  <p:par>
+                    <p:cTn fill="hold">
+                      <p:stCondLst>
+                        <p:cond delay="indefinite"/>
+                      </p:stCondLst>
+                      <p:childTnLst>
+                        <p:par>
+                          <p:cTn fill="hold">
+                            <p:stCondLst>
+                              <p:cond delay="0"/>
+                            </p:stCondLst>
+                            <p:childTnLst>
+                              <p:par>
+                                <p:cTn fill="hold" nodeType="clickEffect" presetClass="entr" presetID="10" presetSubtype="0">
+                                  <p:stCondLst>
+                                    <p:cond delay="0"/>
+                                  </p:stCondLst>
+                                  <p:childTnLst>
+                                    <p:set>
+                                      <p:cBhvr>
+                                        <p:cTn dur="1" fill="hold">
+                                          <p:stCondLst>
+                                            <p:cond delay="0"/>
+                                          </p:stCondLst>
+                                        </p:cTn>
+                                        <p:tgtEl>
+                                          <p:spTgt spid="75"/>
+                                        </p:tgtEl>
+                                        <p:attrNameLst>
+                                          <p:attrName>style.visibility</p:attrName>
+                                        </p:attrNameLst>
+                                      </p:cBhvr>
+                                      <p:to>
+                                        <p:strVal val="visible"/>
+                                      </p:to>
+                                    </p:set>
+                                    <p:animEffect filter="fade" transition="in">
+                                      <p:cBhvr>
+                                        <p:cTn dur="1000"/>
+                                        <p:tgtEl>
+                                          <p:spTgt spid="75"/>
+                                        </p:tgtEl>
+                                      </p:cBhvr>
+                                    </p:animEffect>
+                                  </p:childTnLst>
+                                </p:cTn>
+                              </p:par>
+                            </p:childTnLst>
+                          </p:cTn>
+                        </p:par>
+                      </p:childTnLst>
+                    </p:cTn>
+                  </p:par>
+                  <p:par>
+                    <p:cTn fill="hold">
+                      <p:stCondLst>
+                        <p:cond delay="indefinite"/>
+                      </p:stCondLst>
+                      <p:childTnLst>
+                        <p:par>
+                          <p:cTn fill="hold">
+                            <p:stCondLst>
+                              <p:cond delay="0"/>
+                            </p:stCondLst>
+                            <p:childTnLst>
+                              <p:par>
+                                <p:cTn fill="hold" nodeType="clickEffect" presetClass="entr" presetID="10" presetSubtype="0">
+                                  <p:stCondLst>
+                                    <p:cond delay="0"/>
+                                  </p:stCondLst>
+                                  <p:childTnLst>
+                                    <p:set>
+                                      <p:cBhvr>
+                                        <p:cTn dur="1" fill="hold">
+                                          <p:stCondLst>
+                                            <p:cond delay="0"/>
+                                          </p:stCondLst>
+                                        </p:cTn>
+                                        <p:tgtEl>
+                                          <p:spTgt spid="76"/>
+                                        </p:tgtEl>
+                                        <p:attrNameLst>
+                                          <p:attrName>style.visibility</p:attrName>
+                                        </p:attrNameLst>
+                                      </p:cBhvr>
+                                      <p:to>
+                                        <p:strVal val="visible"/>
+                                      </p:to>
+                                    </p:set>
+                                    <p:animEffect filter="fade" transition="in">
+                                      <p:cBhvr>
+                                        <p:cTn dur="1000"/>
+                                        <p:tgtEl>
+                                          <p:spTgt spid="76"/>
+                                        </p:tgtEl>
+                                      </p:cBhvr>
+                                    </p:animEffect>
+                                  </p:childTnLst>
+                                </p:cTn>
+                              </p:par>
+                            </p:childTnLst>
+                          </p:cTn>
+                        </p:par>
+                      </p:childTnLst>
+                    </p:cTn>
+                  </p:par>
+                </p:childTnLst>
+              </p:cTn>
+              <p:prevCondLst>
+                <p:cond evt="onPrev">
+                  <p:tgtEl>
+                    <p:sldTgt/>
+                  </p:tgtEl>
+                </p:cond>
+              </p:prevCondLst>
+              <p:nextCondLst>
+                <p:cond evt="onNext">
+                  <p:tgtEl>
+                    <p:sldTgt/>
+                  </p:tgtEl>
+                </p:cond>
+              </p:nextCondLst>
+            </p:seq>
+          </p:childTnLst>
+        </p:cTn>
+      </p:par>
+    </p:tnLst>
+  </p:timing>
 </p:sld>
 </file>
 
@@ -9161,7 +9615,7 @@
         </p:nvSpPr>
         <p:spPr>
           <a:xfrm>
-            <a:off x="708850" y="1584675"/>
+            <a:off x="404050" y="1584675"/>
             <a:ext cx="6166200" cy="335100"/>
           </a:xfrm>
           <a:prstGeom prst="rect">
@@ -9204,7 +9658,7 @@
         </p:nvSpPr>
         <p:spPr>
           <a:xfrm>
-            <a:off x="853725" y="1843575"/>
+            <a:off x="548925" y="1843575"/>
             <a:ext cx="6166200" cy="335100"/>
           </a:xfrm>
           <a:prstGeom prst="rect">
@@ -9247,7 +9701,7 @@
         </p:nvSpPr>
         <p:spPr>
           <a:xfrm>
-            <a:off x="853725" y="2109633"/>
+            <a:off x="548925" y="2109633"/>
             <a:ext cx="6166200" cy="335100"/>
           </a:xfrm>
           <a:prstGeom prst="rect">
@@ -9290,7 +9744,7 @@
         </p:nvSpPr>
         <p:spPr>
           <a:xfrm>
-            <a:off x="853725" y="2375692"/>
+            <a:off x="548925" y="2375692"/>
             <a:ext cx="6166200" cy="335100"/>
           </a:xfrm>
           <a:prstGeom prst="rect">
@@ -9333,7 +9787,7 @@
         </p:nvSpPr>
         <p:spPr>
           <a:xfrm>
-            <a:off x="853725" y="2641750"/>
+            <a:off x="548925" y="2641750"/>
             <a:ext cx="6166200" cy="335100"/>
           </a:xfrm>
           <a:prstGeom prst="rect">
@@ -9376,7 +9830,7 @@
         </p:nvSpPr>
         <p:spPr>
           <a:xfrm>
-            <a:off x="1060800" y="2861825"/>
+            <a:off x="756000" y="2861825"/>
             <a:ext cx="6166200" cy="335100"/>
           </a:xfrm>
           <a:prstGeom prst="rect">
@@ -9419,7 +9873,7 @@
         </p:nvSpPr>
         <p:spPr>
           <a:xfrm>
-            <a:off x="1060800" y="3086400"/>
+            <a:off x="756000" y="3086400"/>
             <a:ext cx="6166200" cy="335100"/>
           </a:xfrm>
           <a:prstGeom prst="rect">
@@ -9462,7 +9916,7 @@
         </p:nvSpPr>
         <p:spPr>
           <a:xfrm>
-            <a:off x="1060800" y="3310975"/>
+            <a:off x="756000" y="3310975"/>
             <a:ext cx="6166200" cy="335100"/>
           </a:xfrm>
           <a:prstGeom prst="rect">
@@ -9505,7 +9959,7 @@
         </p:nvSpPr>
         <p:spPr>
           <a:xfrm>
-            <a:off x="856725" y="3614025"/>
+            <a:off x="551925" y="3614025"/>
             <a:ext cx="6166200" cy="335100"/>
           </a:xfrm>
           <a:prstGeom prst="rect">
@@ -9548,7 +10002,7 @@
         </p:nvSpPr>
         <p:spPr>
           <a:xfrm>
-            <a:off x="856725" y="3913225"/>
+            <a:off x="551925" y="3913225"/>
             <a:ext cx="6166200" cy="335100"/>
           </a:xfrm>
           <a:prstGeom prst="rect">
@@ -9591,7 +10045,7 @@
         </p:nvSpPr>
         <p:spPr>
           <a:xfrm>
-            <a:off x="856725" y="4212425"/>
+            <a:off x="551925" y="4212425"/>
             <a:ext cx="6166200" cy="335100"/>
           </a:xfrm>
           <a:prstGeom prst="rect">
@@ -9628,12 +10082,14 @@
       </p:sp>
       <p:pic>
         <p:nvPicPr>
-          <p:cNvPr id="120" name="Google Shape;120;p16"/>
+          <p:cNvPr id="120" name="Google Shape;120;p16">
+            <a:hlinkClick r:id="rId4"/>
+          </p:cNvPr>
           <p:cNvPicPr preferRelativeResize="0"/>
           <p:nvPr/>
         </p:nvPicPr>
         <p:blipFill>
-          <a:blip r:embed="rId4">
+          <a:blip r:embed="rId5">
             <a:alphaModFix/>
           </a:blip>
           <a:stretch>
@@ -9642,8 +10098,8 @@
         </p:blipFill>
         <p:spPr>
           <a:xfrm>
-            <a:off x="4931654" y="1899439"/>
-            <a:ext cx="3831571" cy="2174675"/>
+            <a:off x="4545316" y="2086875"/>
+            <a:ext cx="4487558" cy="1773326"/>
           </a:xfrm>
           <a:prstGeom prst="rect">
             <a:avLst/>
@@ -9853,7 +10309,7 @@
                                     </p:set>
                                     <p:animEffect filter="fade" transition="in">
                                       <p:cBhvr>
-                                        <p:cTn dur="1000"/>
+                                        <p:cTn dur="1500"/>
                                         <p:tgtEl>
                                           <p:spTgt spid="111"/>
                                         </p:tgtEl>
@@ -10689,328 +11145,43 @@
           </a:p>
         </p:txBody>
       </p:sp>
-      <p:grpSp>
-        <p:nvGrpSpPr>
-          <p:cNvPr id="132" name="Google Shape;132;p17"/>
-          <p:cNvGrpSpPr/>
+      <p:pic>
+        <p:nvPicPr>
+          <p:cNvPr id="132" name="Google Shape;132;p17">
+            <a:hlinkClick r:id="rId4"/>
+          </p:cNvPr>
+          <p:cNvPicPr preferRelativeResize="0"/>
           <p:nvPr/>
-        </p:nvGrpSpPr>
-        <p:grpSpPr>
-          <a:xfrm>
-            <a:off x="1573625" y="2541625"/>
-            <a:ext cx="4600575" cy="1362075"/>
-            <a:chOff x="1573625" y="2541625"/>
-            <a:chExt cx="4600575" cy="1362075"/>
-          </a:xfrm>
-        </p:grpSpPr>
-        <p:pic>
-          <p:nvPicPr>
-            <p:cNvPr id="133" name="Google Shape;133;p17"/>
-            <p:cNvPicPr preferRelativeResize="0"/>
-            <p:nvPr/>
-          </p:nvPicPr>
-          <p:blipFill>
-            <a:blip r:embed="rId4">
-              <a:alphaModFix/>
-            </a:blip>
-            <a:stretch>
-              <a:fillRect/>
-            </a:stretch>
-          </p:blipFill>
-          <p:spPr>
-            <a:xfrm>
-              <a:off x="1573625" y="2541625"/>
-              <a:ext cx="4600575" cy="1362075"/>
-            </a:xfrm>
-            <a:prstGeom prst="rect">
-              <a:avLst/>
-            </a:prstGeom>
+        </p:nvPicPr>
+        <p:blipFill>
+          <a:blip r:embed="rId5">
+            <a:alphaModFix/>
+          </a:blip>
+          <a:stretch>
+            <a:fillRect/>
+          </a:stretch>
+        </p:blipFill>
+        <p:spPr>
+          <a:xfrm>
+            <a:off x="1751449" y="2403275"/>
+            <a:ext cx="5411947" cy="1992100"/>
+          </a:xfrm>
+          <a:prstGeom prst="rect">
+            <a:avLst/>
+          </a:prstGeom>
+          <a:noFill/>
+          <a:ln>
             <a:noFill/>
-            <a:ln>
-              <a:noFill/>
-            </a:ln>
-          </p:spPr>
-        </p:pic>
-        <p:sp>
-          <p:nvSpPr>
-            <p:cNvPr id="134" name="Google Shape;134;p17"/>
-            <p:cNvSpPr/>
-            <p:nvPr/>
-          </p:nvSpPr>
-          <p:spPr>
-            <a:xfrm>
-              <a:off x="5797700" y="2917675"/>
-              <a:ext cx="293400" cy="203100"/>
-            </a:xfrm>
-            <a:prstGeom prst="rect">
-              <a:avLst/>
-            </a:prstGeom>
-            <a:solidFill>
-              <a:srgbClr val="FFFFFF"/>
-            </a:solidFill>
-            <a:ln>
-              <a:noFill/>
-            </a:ln>
-          </p:spPr>
-          <p:txBody>
-            <a:bodyPr anchorCtr="0" anchor="ctr" bIns="91425" lIns="91425" spcFirstLastPara="1" rIns="91425" wrap="square" tIns="91425">
-              <a:noAutofit/>
-            </a:bodyPr>
-            <a:lstStyle/>
-            <a:p>
-              <a:pPr indent="0" lvl="0" marL="0" rtl="0" algn="l">
-                <a:spcBef>
-                  <a:spcPts val="0"/>
-                </a:spcBef>
-                <a:spcAft>
-                  <a:spcPts val="0"/>
-                </a:spcAft>
-                <a:buNone/>
-              </a:pPr>
-              <a:r>
-                <a:t/>
-              </a:r>
-              <a:endParaRPr/>
-            </a:p>
-          </p:txBody>
-        </p:sp>
-        <p:sp>
-          <p:nvSpPr>
-            <p:cNvPr id="135" name="Google Shape;135;p17"/>
-            <p:cNvSpPr txBox="1"/>
-            <p:nvPr/>
-          </p:nvSpPr>
-          <p:spPr>
-            <a:xfrm>
-              <a:off x="5797700" y="2843784"/>
-              <a:ext cx="195300" cy="255600"/>
-            </a:xfrm>
-            <a:prstGeom prst="rect">
-              <a:avLst/>
-            </a:prstGeom>
-            <a:noFill/>
-            <a:ln>
-              <a:noFill/>
-            </a:ln>
-          </p:spPr>
-          <p:txBody>
-            <a:bodyPr anchorCtr="0" anchor="t" bIns="91425" lIns="91425" spcFirstLastPara="1" rIns="91425" wrap="square" tIns="91425">
-              <a:noAutofit/>
-            </a:bodyPr>
-            <a:lstStyle/>
-            <a:p>
-              <a:pPr indent="0" lvl="0" marL="0" rtl="0" algn="ctr">
-                <a:spcBef>
-                  <a:spcPts val="0"/>
-                </a:spcBef>
-                <a:spcAft>
-                  <a:spcPts val="0"/>
-                </a:spcAft>
-                <a:buNone/>
-              </a:pPr>
-              <a:r>
-                <a:rPr lang="en" sz="1200">
-                  <a:solidFill>
-                    <a:srgbClr val="666666"/>
-                  </a:solidFill>
-                </a:rPr>
-                <a:t>3</a:t>
-              </a:r>
-              <a:endParaRPr sz="1200">
-                <a:solidFill>
-                  <a:srgbClr val="666666"/>
-                </a:solidFill>
-              </a:endParaRPr>
-            </a:p>
-          </p:txBody>
-        </p:sp>
-        <p:sp>
-          <p:nvSpPr>
-            <p:cNvPr id="136" name="Google Shape;136;p17"/>
-            <p:cNvSpPr/>
-            <p:nvPr/>
-          </p:nvSpPr>
-          <p:spPr>
-            <a:xfrm>
-              <a:off x="5797700" y="3256025"/>
-              <a:ext cx="195300" cy="203100"/>
-            </a:xfrm>
-            <a:prstGeom prst="rect">
-              <a:avLst/>
-            </a:prstGeom>
-            <a:solidFill>
-              <a:srgbClr val="F8F7F7"/>
-            </a:solidFill>
-            <a:ln>
-              <a:noFill/>
-            </a:ln>
-          </p:spPr>
-          <p:txBody>
-            <a:bodyPr anchorCtr="0" anchor="ctr" bIns="91425" lIns="91425" spcFirstLastPara="1" rIns="91425" wrap="square" tIns="91425">
-              <a:noAutofit/>
-            </a:bodyPr>
-            <a:lstStyle/>
-            <a:p>
-              <a:pPr indent="0" lvl="0" marL="0" rtl="0" algn="l">
-                <a:spcBef>
-                  <a:spcPts val="0"/>
-                </a:spcBef>
-                <a:spcAft>
-                  <a:spcPts val="0"/>
-                </a:spcAft>
-                <a:buNone/>
-              </a:pPr>
-              <a:r>
-                <a:t/>
-              </a:r>
-              <a:endParaRPr/>
-            </a:p>
-          </p:txBody>
-        </p:sp>
-        <p:sp>
-          <p:nvSpPr>
-            <p:cNvPr id="137" name="Google Shape;137;p17"/>
-            <p:cNvSpPr txBox="1"/>
-            <p:nvPr/>
-          </p:nvSpPr>
-          <p:spPr>
-            <a:xfrm>
-              <a:off x="5797700" y="3163824"/>
-              <a:ext cx="195300" cy="255600"/>
-            </a:xfrm>
-            <a:prstGeom prst="rect">
-              <a:avLst/>
-            </a:prstGeom>
-            <a:noFill/>
-            <a:ln>
-              <a:noFill/>
-            </a:ln>
-          </p:spPr>
-          <p:txBody>
-            <a:bodyPr anchorCtr="0" anchor="t" bIns="91425" lIns="91425" spcFirstLastPara="1" rIns="91425" wrap="square" tIns="91425">
-              <a:noAutofit/>
-            </a:bodyPr>
-            <a:lstStyle/>
-            <a:p>
-              <a:pPr indent="0" lvl="0" marL="0" rtl="0" algn="ctr">
-                <a:spcBef>
-                  <a:spcPts val="0"/>
-                </a:spcBef>
-                <a:spcAft>
-                  <a:spcPts val="0"/>
-                </a:spcAft>
-                <a:buNone/>
-              </a:pPr>
-              <a:r>
-                <a:rPr lang="en" sz="1200">
-                  <a:solidFill>
-                    <a:srgbClr val="666666"/>
-                  </a:solidFill>
-                </a:rPr>
-                <a:t>4</a:t>
-              </a:r>
-              <a:endParaRPr sz="1200">
-                <a:solidFill>
-                  <a:srgbClr val="666666"/>
-                </a:solidFill>
-              </a:endParaRPr>
-            </a:p>
-          </p:txBody>
-        </p:sp>
-        <p:sp>
-          <p:nvSpPr>
-            <p:cNvPr id="138" name="Google Shape;138;p17"/>
-            <p:cNvSpPr/>
-            <p:nvPr/>
-          </p:nvSpPr>
-          <p:spPr>
-            <a:xfrm>
-              <a:off x="5748650" y="3541800"/>
-              <a:ext cx="293400" cy="255600"/>
-            </a:xfrm>
-            <a:prstGeom prst="rect">
-              <a:avLst/>
-            </a:prstGeom>
-            <a:solidFill>
-              <a:srgbClr val="FFFFFF"/>
-            </a:solidFill>
-            <a:ln>
-              <a:noFill/>
-            </a:ln>
-          </p:spPr>
-          <p:txBody>
-            <a:bodyPr anchorCtr="0" anchor="ctr" bIns="91425" lIns="91425" spcFirstLastPara="1" rIns="91425" wrap="square" tIns="91425">
-              <a:noAutofit/>
-            </a:bodyPr>
-            <a:lstStyle/>
-            <a:p>
-              <a:pPr indent="0" lvl="0" marL="0" rtl="0" algn="l">
-                <a:spcBef>
-                  <a:spcPts val="0"/>
-                </a:spcBef>
-                <a:spcAft>
-                  <a:spcPts val="0"/>
-                </a:spcAft>
-                <a:buNone/>
-              </a:pPr>
-              <a:r>
-                <a:t/>
-              </a:r>
-              <a:endParaRPr/>
-            </a:p>
-          </p:txBody>
-        </p:sp>
-        <p:sp>
-          <p:nvSpPr>
-            <p:cNvPr id="139" name="Google Shape;139;p17"/>
-            <p:cNvSpPr txBox="1"/>
-            <p:nvPr/>
-          </p:nvSpPr>
-          <p:spPr>
-            <a:xfrm>
-              <a:off x="5797296" y="3483864"/>
-              <a:ext cx="195300" cy="255600"/>
-            </a:xfrm>
-            <a:prstGeom prst="rect">
-              <a:avLst/>
-            </a:prstGeom>
-            <a:noFill/>
-            <a:ln>
-              <a:noFill/>
-            </a:ln>
-          </p:spPr>
-          <p:txBody>
-            <a:bodyPr anchorCtr="0" anchor="t" bIns="91425" lIns="91425" spcFirstLastPara="1" rIns="91425" wrap="square" tIns="91425">
-              <a:noAutofit/>
-            </a:bodyPr>
-            <a:lstStyle/>
-            <a:p>
-              <a:pPr indent="0" lvl="0" marL="0" rtl="0" algn="ctr">
-                <a:spcBef>
-                  <a:spcPts val="0"/>
-                </a:spcBef>
-                <a:spcAft>
-                  <a:spcPts val="0"/>
-                </a:spcAft>
-                <a:buNone/>
-              </a:pPr>
-              <a:r>
-                <a:rPr lang="en" sz="1200">
-                  <a:solidFill>
-                    <a:srgbClr val="666666"/>
-                  </a:solidFill>
-                </a:rPr>
-                <a:t>1</a:t>
-              </a:r>
-              <a:endParaRPr sz="1200">
-                <a:solidFill>
-                  <a:srgbClr val="666666"/>
-                </a:solidFill>
-              </a:endParaRPr>
-            </a:p>
-          </p:txBody>
-        </p:sp>
-      </p:grpSp>
+          </a:ln>
+          <a:effectLst>
+            <a:outerShdw blurRad="57150" rotWithShape="0" algn="bl" dir="5400000" dist="19050">
+              <a:srgbClr val="000000">
+                <a:alpha val="50000"/>
+              </a:srgbClr>
+            </a:outerShdw>
+          </a:effectLst>
+        </p:spPr>
+      </p:pic>
     </p:spTree>
   </p:cSld>
   <p:clrMapOvr>
@@ -11195,7 +11366,7 @@
   <p:cSld>
     <p:spTree>
       <p:nvGrpSpPr>
-        <p:cNvPr id="143" name="Shape 143"/>
+        <p:cNvPr id="136" name="Shape 136"/>
         <p:cNvGrpSpPr/>
         <p:nvPr/>
       </p:nvGrpSpPr>
@@ -11209,7 +11380,7 @@
       </p:grpSpPr>
       <p:sp>
         <p:nvSpPr>
-          <p:cNvPr id="144" name="Google Shape;144;p18"/>
+          <p:cNvPr id="137" name="Google Shape;137;p18"/>
           <p:cNvSpPr/>
           <p:nvPr/>
         </p:nvSpPr>
@@ -11275,7 +11446,7 @@
       </p:sp>
       <p:sp>
         <p:nvSpPr>
-          <p:cNvPr id="145" name="Google Shape;145;p18"/>
+          <p:cNvPr id="138" name="Google Shape;138;p18"/>
           <p:cNvSpPr/>
           <p:nvPr/>
         </p:nvSpPr>
@@ -11333,7 +11504,7 @@
       </p:sp>
       <p:sp>
         <p:nvSpPr>
-          <p:cNvPr id="146" name="Google Shape;146;p18"/>
+          <p:cNvPr id="139" name="Google Shape;139;p18"/>
           <p:cNvSpPr/>
           <p:nvPr/>
         </p:nvSpPr>
@@ -11392,7 +11563,7 @@
       </p:sp>
       <p:sp>
         <p:nvSpPr>
-          <p:cNvPr id="147" name="Google Shape;147;p18"/>
+          <p:cNvPr id="140" name="Google Shape;140;p18"/>
           <p:cNvSpPr/>
           <p:nvPr/>
         </p:nvSpPr>
@@ -11450,7 +11621,7 @@
       </p:sp>
       <p:pic>
         <p:nvPicPr>
-          <p:cNvPr id="148" name="Google Shape;148;p18"/>
+          <p:cNvPr id="141" name="Google Shape;141;p18"/>
           <p:cNvPicPr preferRelativeResize="0"/>
           <p:nvPr/>
         </p:nvPicPr>
@@ -11478,7 +11649,7 @@
       </p:pic>
       <p:sp>
         <p:nvSpPr>
-          <p:cNvPr id="149" name="Google Shape;149;p18"/>
+          <p:cNvPr id="142" name="Google Shape;142;p18"/>
           <p:cNvSpPr txBox="1"/>
           <p:nvPr/>
         </p:nvSpPr>
@@ -11521,7 +11692,7 @@
       </p:sp>
       <p:sp>
         <p:nvSpPr>
-          <p:cNvPr id="150" name="Google Shape;150;p18"/>
+          <p:cNvPr id="143" name="Google Shape;143;p18"/>
           <p:cNvSpPr txBox="1"/>
           <p:nvPr/>
         </p:nvSpPr>
@@ -11562,14 +11733,105 @@
           </a:p>
         </p:txBody>
       </p:sp>
+      <p:sp>
+        <p:nvSpPr>
+          <p:cNvPr id="144" name="Google Shape;144;p18"/>
+          <p:cNvSpPr txBox="1"/>
+          <p:nvPr/>
+        </p:nvSpPr>
+        <p:spPr>
+          <a:xfrm>
+            <a:off x="650675" y="3800500"/>
+            <a:ext cx="7132200" cy="335100"/>
+          </a:xfrm>
+          <a:prstGeom prst="rect">
+            <a:avLst/>
+          </a:prstGeom>
+          <a:noFill/>
+          <a:ln>
+            <a:noFill/>
+          </a:ln>
+        </p:spPr>
+        <p:txBody>
+          <a:bodyPr anchorCtr="0" anchor="t" bIns="91425" lIns="91425" spcFirstLastPara="1" rIns="91425" wrap="square" tIns="91425">
+            <a:noAutofit/>
+          </a:bodyPr>
+          <a:lstStyle/>
+          <a:p>
+            <a:pPr indent="-317500" lvl="0" marL="457200" rtl="0" algn="l">
+              <a:spcBef>
+                <a:spcPts val="0"/>
+              </a:spcBef>
+              <a:spcAft>
+                <a:spcPts val="0"/>
+              </a:spcAft>
+              <a:buSzPts val="1400"/>
+              <a:buChar char="❏"/>
+            </a:pPr>
+            <a:r>
+              <a:rPr lang="en"/>
+              <a:t>Use Principal Component Analysis (PCA)</a:t>
+            </a:r>
+            <a:endParaRPr/>
+          </a:p>
+        </p:txBody>
+      </p:sp>
+      <p:sp>
+        <p:nvSpPr>
+          <p:cNvPr id="145" name="Google Shape;145;p18"/>
+          <p:cNvSpPr txBox="1"/>
+          <p:nvPr/>
+        </p:nvSpPr>
+        <p:spPr>
+          <a:xfrm>
+            <a:off x="870750" y="4135600"/>
+            <a:ext cx="7132200" cy="335100"/>
+          </a:xfrm>
+          <a:prstGeom prst="rect">
+            <a:avLst/>
+          </a:prstGeom>
+          <a:noFill/>
+          <a:ln>
+            <a:noFill/>
+          </a:ln>
+        </p:spPr>
+        <p:txBody>
+          <a:bodyPr anchorCtr="0" anchor="t" bIns="91425" lIns="91425" spcFirstLastPara="1" rIns="91425" wrap="square" tIns="91425">
+            <a:noAutofit/>
+          </a:bodyPr>
+          <a:lstStyle/>
+          <a:p>
+            <a:pPr indent="-317500" lvl="0" marL="457200" rtl="0" algn="l">
+              <a:lnSpc>
+                <a:spcPct val="115000"/>
+              </a:lnSpc>
+              <a:spcBef>
+                <a:spcPts val="0"/>
+              </a:spcBef>
+              <a:spcAft>
+                <a:spcPts val="0"/>
+              </a:spcAft>
+              <a:buSzPts val="1400"/>
+              <a:buChar char="❏"/>
+            </a:pPr>
+            <a:r>
+              <a:rPr lang="en"/>
+              <a:t>An unsupervised learning algorithm that reduces the number of features while still retaining as much information as possible</a:t>
+            </a:r>
+            <a:endParaRPr/>
+          </a:p>
+        </p:txBody>
+      </p:sp>
       <p:pic>
         <p:nvPicPr>
-          <p:cNvPr id="151" name="Google Shape;151;p18"/>
+          <p:cNvPr id="146" name="Google Shape;146;p18">
+            <a:hlinkClick r:id="rId4"/>
+          </p:cNvPr>
           <p:cNvPicPr preferRelativeResize="0"/>
           <p:nvPr/>
         </p:nvPicPr>
         <p:blipFill>
-          <a:blip r:embed="rId4">
+          <a:blip r:embed="rId5">
             <a:alphaModFix/>
           </a:blip>
           <a:stretch>
@@ -11578,8 +11840,8 @@
         </p:blipFill>
         <p:spPr>
           <a:xfrm>
-            <a:off x="1190150" y="2308550"/>
-            <a:ext cx="4600575" cy="1362075"/>
+            <a:off x="1239985" y="2178663"/>
+            <a:ext cx="4431564" cy="1631212"/>
           </a:xfrm>
           <a:prstGeom prst="rect">
             <a:avLst/>
@@ -11597,95 +11859,6 @@
           </a:effectLst>
         </p:spPr>
       </p:pic>
-      <p:sp>
-        <p:nvSpPr>
-          <p:cNvPr id="152" name="Google Shape;152;p18"/>
-          <p:cNvSpPr txBox="1"/>
-          <p:nvPr/>
-        </p:nvSpPr>
-        <p:spPr>
-          <a:xfrm>
-            <a:off x="650675" y="3800500"/>
-            <a:ext cx="7132200" cy="335100"/>
-          </a:xfrm>
-          <a:prstGeom prst="rect">
-            <a:avLst/>
-          </a:prstGeom>
-          <a:noFill/>
-          <a:ln>
-            <a:noFill/>
-          </a:ln>
-        </p:spPr>
-        <p:txBody>
-          <a:bodyPr anchorCtr="0" anchor="t" bIns="91425" lIns="91425" spcFirstLastPara="1" rIns="91425" wrap="square" tIns="91425">
-            <a:noAutofit/>
-          </a:bodyPr>
-          <a:lstStyle/>
-          <a:p>
-            <a:pPr indent="-317500" lvl="0" marL="457200" rtl="0" algn="l">
-              <a:spcBef>
-                <a:spcPts val="0"/>
-              </a:spcBef>
-              <a:spcAft>
-                <a:spcPts val="0"/>
-              </a:spcAft>
-              <a:buSzPts val="1400"/>
-              <a:buChar char="❏"/>
-            </a:pPr>
-            <a:r>
-              <a:rPr lang="en"/>
-              <a:t>Use Principal Component Analysis (PCA)</a:t>
-            </a:r>
-            <a:endParaRPr/>
-          </a:p>
-        </p:txBody>
-      </p:sp>
-      <p:sp>
-        <p:nvSpPr>
-          <p:cNvPr id="153" name="Google Shape;153;p18"/>
-          <p:cNvSpPr txBox="1"/>
-          <p:nvPr/>
-        </p:nvSpPr>
-        <p:spPr>
-          <a:xfrm>
-            <a:off x="870750" y="4135600"/>
-            <a:ext cx="7132200" cy="335100"/>
-          </a:xfrm>
-          <a:prstGeom prst="rect">
-            <a:avLst/>
-          </a:prstGeom>
-          <a:noFill/>
-          <a:ln>
-            <a:noFill/>
-          </a:ln>
-        </p:spPr>
-        <p:txBody>
-          <a:bodyPr anchorCtr="0" anchor="t" bIns="91425" lIns="91425" spcFirstLastPara="1" rIns="91425" wrap="square" tIns="91425">
-            <a:noAutofit/>
-          </a:bodyPr>
-          <a:lstStyle/>
-          <a:p>
-            <a:pPr indent="-317500" lvl="0" marL="457200" rtl="0" algn="l">
-              <a:lnSpc>
-                <a:spcPct val="115000"/>
-              </a:lnSpc>
-              <a:spcBef>
-                <a:spcPts val="0"/>
-              </a:spcBef>
-              <a:spcAft>
-                <a:spcPts val="0"/>
-              </a:spcAft>
-              <a:buSzPts val="1400"/>
-              <a:buChar char="❏"/>
-            </a:pPr>
-            <a:r>
-              <a:rPr lang="en"/>
-              <a:t>An unsupervised learning algorithm that reduces the number of features while still retaining as much information as possible</a:t>
-            </a:r>
-            <a:endParaRPr/>
-          </a:p>
-        </p:txBody>
-      </p:sp>
     </p:spTree>
   </p:cSld>
   <p:clrMapOvr>
@@ -11725,7 +11898,7 @@
                                           </p:stCondLst>
                                         </p:cTn>
                                         <p:tgtEl>
-                                          <p:spTgt spid="149"/>
+                                          <p:spTgt spid="142"/>
                                         </p:tgtEl>
                                         <p:attrNameLst>
                                           <p:attrName>style.visibility</p:attrName>
@@ -11739,7 +11912,7 @@
                                       <p:cBhvr>
                                         <p:cTn dur="1000"/>
                                         <p:tgtEl>
-                                          <p:spTgt spid="149"/>
+                                          <p:spTgt spid="142"/>
                                         </p:tgtEl>
                                       </p:cBhvr>
                                     </p:animEffect>
@@ -11778,7 +11951,7 @@
                                           </p:stCondLst>
                                         </p:cTn>
                                         <p:tgtEl>
-                                          <p:spTgt spid="150"/>
+                                          <p:spTgt spid="143"/>
                                         </p:tgtEl>
                                         <p:attrNameLst>
                                           <p:attrName>style.visibility</p:attrName>
@@ -11792,7 +11965,7 @@
                                       <p:cBhvr>
                                         <p:cTn dur="1000"/>
                                         <p:tgtEl>
-                                          <p:spTgt spid="150"/>
+                                          <p:spTgt spid="143"/>
                                         </p:tgtEl>
                                       </p:cBhvr>
                                     </p:animEffect>
@@ -11813,7 +11986,7 @@
                                           </p:stCondLst>
                                         </p:cTn>
                                         <p:tgtEl>
-                                          <p:spTgt spid="151"/>
+                                          <p:spTgt spid="146"/>
                                         </p:tgtEl>
                                         <p:attrNameLst>
                                           <p:attrName>style.visibility</p:attrName>
@@ -11827,7 +12000,7 @@
                                       <p:cBhvr>
                                         <p:cTn dur="1000"/>
                                         <p:tgtEl>
-                                          <p:spTgt spid="151"/>
+                                          <p:spTgt spid="146"/>
                                         </p:tgtEl>
                                       </p:cBhvr>
                                     </p:animEffect>
@@ -11866,7 +12039,7 @@
                                           </p:stCondLst>
                                         </p:cTn>
                                         <p:tgtEl>
-                                          <p:spTgt spid="152"/>
+                                          <p:spTgt spid="144"/>
                                         </p:tgtEl>
                                         <p:attrNameLst>
                                           <p:attrName>style.visibility</p:attrName>
@@ -11880,7 +12053,7 @@
                                       <p:cBhvr>
                                         <p:cTn dur="1000"/>
                                         <p:tgtEl>
-                                          <p:spTgt spid="152"/>
+                                          <p:spTgt spid="144"/>
                                         </p:tgtEl>
                                       </p:cBhvr>
                                     </p:animEffect>
@@ -11919,7 +12092,7 @@
                                           </p:stCondLst>
                                         </p:cTn>
                                         <p:tgtEl>
-                                          <p:spTgt spid="153"/>
+                                          <p:spTgt spid="145"/>
                                         </p:tgtEl>
                                         <p:attrNameLst>
                                           <p:attrName>style.visibility</p:attrName>
@@ -11933,7 +12106,7 @@
                                       <p:cBhvr>
                                         <p:cTn dur="1000"/>
                                         <p:tgtEl>
-                                          <p:spTgt spid="153"/>
+                                          <p:spTgt spid="145"/>
                                         </p:tgtEl>
                                       </p:cBhvr>
                                     </p:animEffect>
@@ -11976,7 +12149,7 @@
   <p:cSld>
     <p:spTree>
       <p:nvGrpSpPr>
-        <p:cNvPr id="157" name="Shape 157"/>
+        <p:cNvPr id="150" name="Shape 150"/>
         <p:cNvGrpSpPr/>
         <p:nvPr/>
       </p:nvGrpSpPr>
@@ -11990,7 +12163,7 @@
       </p:grpSpPr>
       <p:sp>
         <p:nvSpPr>
-          <p:cNvPr id="158" name="Google Shape;158;p19"/>
+          <p:cNvPr id="151" name="Google Shape;151;p19"/>
           <p:cNvSpPr/>
           <p:nvPr/>
         </p:nvSpPr>
@@ -12056,7 +12229,7 @@
       </p:sp>
       <p:sp>
         <p:nvSpPr>
-          <p:cNvPr id="159" name="Google Shape;159;p19"/>
+          <p:cNvPr id="152" name="Google Shape;152;p19"/>
           <p:cNvSpPr/>
           <p:nvPr/>
         </p:nvSpPr>
@@ -12114,7 +12287,7 @@
       </p:sp>
       <p:sp>
         <p:nvSpPr>
-          <p:cNvPr id="160" name="Google Shape;160;p19"/>
+          <p:cNvPr id="153" name="Google Shape;153;p19"/>
           <p:cNvSpPr/>
           <p:nvPr/>
         </p:nvSpPr>
@@ -12173,7 +12346,7 @@
       </p:sp>
       <p:sp>
         <p:nvSpPr>
-          <p:cNvPr id="161" name="Google Shape;161;p19"/>
+          <p:cNvPr id="154" name="Google Shape;154;p19"/>
           <p:cNvSpPr/>
           <p:nvPr/>
         </p:nvSpPr>
@@ -12231,7 +12404,7 @@
       </p:sp>
       <p:pic>
         <p:nvPicPr>
-          <p:cNvPr id="162" name="Google Shape;162;p19"/>
+          <p:cNvPr id="155" name="Google Shape;155;p19"/>
           <p:cNvPicPr preferRelativeResize="0"/>
           <p:nvPr/>
         </p:nvPicPr>
@@ -12259,7 +12432,7 @@
       </p:pic>
       <p:sp>
         <p:nvSpPr>
-          <p:cNvPr id="163" name="Google Shape;163;p19"/>
+          <p:cNvPr id="156" name="Google Shape;156;p19"/>
           <p:cNvSpPr txBox="1"/>
           <p:nvPr/>
         </p:nvSpPr>
@@ -12302,7 +12475,7 @@
       </p:sp>
       <p:sp>
         <p:nvSpPr>
-          <p:cNvPr id="164" name="Google Shape;164;p19"/>
+          <p:cNvPr id="157" name="Google Shape;157;p19"/>
           <p:cNvSpPr txBox="1"/>
           <p:nvPr/>
         </p:nvSpPr>
@@ -12343,14 +12516,59 @@
           </a:p>
         </p:txBody>
       </p:sp>
+      <p:sp>
+        <p:nvSpPr>
+          <p:cNvPr id="158" name="Google Shape;158;p19"/>
+          <p:cNvSpPr txBox="1"/>
+          <p:nvPr/>
+        </p:nvSpPr>
+        <p:spPr>
+          <a:xfrm>
+            <a:off x="671250" y="1738025"/>
+            <a:ext cx="7132200" cy="335100"/>
+          </a:xfrm>
+          <a:prstGeom prst="rect">
+            <a:avLst/>
+          </a:prstGeom>
+          <a:noFill/>
+          <a:ln>
+            <a:noFill/>
+          </a:ln>
+        </p:spPr>
+        <p:txBody>
+          <a:bodyPr anchorCtr="0" anchor="t" bIns="91425" lIns="91425" spcFirstLastPara="1" rIns="91425" wrap="square" tIns="91425">
+            <a:noAutofit/>
+          </a:bodyPr>
+          <a:lstStyle/>
+          <a:p>
+            <a:pPr indent="-317500" lvl="0" marL="457200" rtl="0" algn="l">
+              <a:spcBef>
+                <a:spcPts val="0"/>
+              </a:spcBef>
+              <a:spcAft>
+                <a:spcPts val="0"/>
+              </a:spcAft>
+              <a:buSzPts val="1400"/>
+              <a:buChar char="❏"/>
+            </a:pPr>
+            <a:r>
+              <a:rPr lang="en"/>
+              <a:t>Encode categorical data to integers</a:t>
+            </a:r>
+            <a:endParaRPr/>
+          </a:p>
+        </p:txBody>
+      </p:sp>
       <p:pic>
         <p:nvPicPr>
-          <p:cNvPr id="165" name="Google Shape;165;p19"/>
+          <p:cNvPr id="159" name="Google Shape;159;p19">
+            <a:hlinkClick r:id="rId4"/>
+          </p:cNvPr>
           <p:cNvPicPr preferRelativeResize="0"/>
           <p:nvPr/>
         </p:nvPicPr>
         <p:blipFill>
-          <a:blip r:embed="rId4">
+          <a:blip r:embed="rId5">
             <a:alphaModFix/>
           </a:blip>
           <a:stretch>
@@ -12359,8 +12577,8 @@
         </p:blipFill>
         <p:spPr>
           <a:xfrm>
-            <a:off x="1204900" y="3140775"/>
-            <a:ext cx="6734175" cy="1695450"/>
+            <a:off x="1270825" y="3044898"/>
+            <a:ext cx="6002425" cy="1922000"/>
           </a:xfrm>
           <a:prstGeom prst="rect">
             <a:avLst/>
@@ -12378,49 +12596,6 @@
           </a:effectLst>
         </p:spPr>
       </p:pic>
-      <p:sp>
-        <p:nvSpPr>
-          <p:cNvPr id="166" name="Google Shape;166;p19"/>
-          <p:cNvSpPr txBox="1"/>
-          <p:nvPr/>
-        </p:nvSpPr>
-        <p:spPr>
-          <a:xfrm>
-            <a:off x="671250" y="1738025"/>
-            <a:ext cx="7132200" cy="335100"/>
-          </a:xfrm>
-          <a:prstGeom prst="rect">
-            <a:avLst/>
-          </a:prstGeom>
-          <a:noFill/>
-          <a:ln>
-            <a:noFill/>
-          </a:ln>
-        </p:spPr>
-        <p:txBody>
-          <a:bodyPr anchorCtr="0" anchor="t" bIns="91425" lIns="91425" spcFirstLastPara="1" rIns="91425" wrap="square" tIns="91425">
-            <a:noAutofit/>
-          </a:bodyPr>
-          <a:lstStyle/>
-          <a:p>
-            <a:pPr indent="-317500" lvl="0" marL="457200" rtl="0" algn="l">
-              <a:spcBef>
-                <a:spcPts val="0"/>
-              </a:spcBef>
-              <a:spcAft>
-                <a:spcPts val="0"/>
-              </a:spcAft>
-              <a:buSzPts val="1400"/>
-              <a:buChar char="❏"/>
-            </a:pPr>
-            <a:r>
-              <a:rPr lang="en"/>
-              <a:t>Encode categorical data to integers</a:t>
-            </a:r>
-            <a:endParaRPr/>
-          </a:p>
-        </p:txBody>
-      </p:sp>
     </p:spTree>
   </p:cSld>
   <p:clrMapOvr>
@@ -12460,7 +12635,7 @@
                                           </p:stCondLst>
                                         </p:cTn>
                                         <p:tgtEl>
-                                          <p:spTgt spid="166"/>
+                                          <p:spTgt spid="158"/>
                                         </p:tgtEl>
                                         <p:attrNameLst>
                                           <p:attrName>style.visibility</p:attrName>
@@ -12474,7 +12649,7 @@
                                       <p:cBhvr>
                                         <p:cTn dur="1000"/>
                                         <p:tgtEl>
-                                          <p:spTgt spid="166"/>
+                                          <p:spTgt spid="158"/>
                                         </p:tgtEl>
                                       </p:cBhvr>
                                     </p:animEffect>
@@ -12513,7 +12688,7 @@
                                           </p:stCondLst>
                                         </p:cTn>
                                         <p:tgtEl>
-                                          <p:spTgt spid="164"/>
+                                          <p:spTgt spid="157"/>
                                         </p:tgtEl>
                                         <p:attrNameLst>
                                           <p:attrName>style.visibility</p:attrName>
@@ -12527,7 +12702,7 @@
                                       <p:cBhvr>
                                         <p:cTn dur="1000"/>
                                         <p:tgtEl>
-                                          <p:spTgt spid="164"/>
+                                          <p:spTgt spid="157"/>
                                         </p:tgtEl>
                                       </p:cBhvr>
                                     </p:animEffect>
@@ -12566,7 +12741,7 @@
                                           </p:stCondLst>
                                         </p:cTn>
                                         <p:tgtEl>
-                                          <p:spTgt spid="163"/>
+                                          <p:spTgt spid="156"/>
                                         </p:tgtEl>
                                         <p:attrNameLst>
                                           <p:attrName>style.visibility</p:attrName>
@@ -12580,7 +12755,7 @@
                                       <p:cBhvr>
                                         <p:cTn dur="1000"/>
                                         <p:tgtEl>
-                                          <p:spTgt spid="163"/>
+                                          <p:spTgt spid="156"/>
                                         </p:tgtEl>
                                       </p:cBhvr>
                                     </p:animEffect>
@@ -12601,7 +12776,7 @@
                                           </p:stCondLst>
                                         </p:cTn>
                                         <p:tgtEl>
-                                          <p:spTgt spid="165"/>
+                                          <p:spTgt spid="159"/>
                                         </p:tgtEl>
                                         <p:attrNameLst>
                                           <p:attrName>style.visibility</p:attrName>
@@ -12615,7 +12790,7 @@
                                       <p:cBhvr>
                                         <p:cTn dur="1000"/>
                                         <p:tgtEl>
-                                          <p:spTgt spid="165"/>
+                                          <p:spTgt spid="159"/>
                                         </p:tgtEl>
                                       </p:cBhvr>
                                     </p:animEffect>
@@ -12658,7 +12833,7 @@
   <p:cSld>
     <p:spTree>
       <p:nvGrpSpPr>
-        <p:cNvPr id="170" name="Shape 170"/>
+        <p:cNvPr id="163" name="Shape 163"/>
         <p:cNvGrpSpPr/>
         <p:nvPr/>
       </p:nvGrpSpPr>
@@ -12672,7 +12847,7 @@
       </p:grpSpPr>
       <p:sp>
         <p:nvSpPr>
-          <p:cNvPr id="171" name="Google Shape;171;p20"/>
+          <p:cNvPr id="164" name="Google Shape;164;p20"/>
           <p:cNvSpPr/>
           <p:nvPr/>
         </p:nvSpPr>
@@ -12738,7 +12913,7 @@
       </p:sp>
       <p:sp>
         <p:nvSpPr>
-          <p:cNvPr id="172" name="Google Shape;172;p20"/>
+          <p:cNvPr id="165" name="Google Shape;165;p20"/>
           <p:cNvSpPr/>
           <p:nvPr/>
         </p:nvSpPr>
@@ -12796,7 +12971,7 @@
       </p:sp>
       <p:sp>
         <p:nvSpPr>
-          <p:cNvPr id="173" name="Google Shape;173;p20"/>
+          <p:cNvPr id="166" name="Google Shape;166;p20"/>
           <p:cNvSpPr/>
           <p:nvPr/>
         </p:nvSpPr>
@@ -12855,7 +13030,7 @@
       </p:sp>
       <p:sp>
         <p:nvSpPr>
-          <p:cNvPr id="174" name="Google Shape;174;p20"/>
+          <p:cNvPr id="167" name="Google Shape;167;p20"/>
           <p:cNvSpPr/>
           <p:nvPr/>
         </p:nvSpPr>
@@ -12913,7 +13088,7 @@
       </p:sp>
       <p:pic>
         <p:nvPicPr>
-          <p:cNvPr id="175" name="Google Shape;175;p20"/>
+          <p:cNvPr id="168" name="Google Shape;168;p20"/>
           <p:cNvPicPr preferRelativeResize="0"/>
           <p:nvPr/>
         </p:nvPicPr>
@@ -12941,7 +13116,7 @@
       </p:pic>
       <p:sp>
         <p:nvSpPr>
-          <p:cNvPr id="176" name="Google Shape;176;p20"/>
+          <p:cNvPr id="169" name="Google Shape;169;p20"/>
           <p:cNvSpPr txBox="1"/>
           <p:nvPr/>
         </p:nvSpPr>
@@ -12991,7 +13166,7 @@
       </p:sp>
       <p:sp>
         <p:nvSpPr>
-          <p:cNvPr id="177" name="Google Shape;177;p20"/>
+          <p:cNvPr id="170" name="Google Shape;170;p20"/>
           <p:cNvSpPr txBox="1"/>
           <p:nvPr/>
         </p:nvSpPr>
@@ -13041,7 +13216,7 @@
       </p:sp>
       <p:sp>
         <p:nvSpPr>
-          <p:cNvPr id="178" name="Google Shape;178;p20"/>
+          <p:cNvPr id="171" name="Google Shape;171;p20"/>
           <p:cNvSpPr txBox="1"/>
           <p:nvPr/>
         </p:nvSpPr>
@@ -13091,7 +13266,7 @@
       </p:sp>
       <p:sp>
         <p:nvSpPr>
-          <p:cNvPr id="179" name="Google Shape;179;p20"/>
+          <p:cNvPr id="172" name="Google Shape;172;p20"/>
           <p:cNvSpPr txBox="1"/>
           <p:nvPr/>
         </p:nvSpPr>
@@ -13141,7 +13316,7 @@
       </p:sp>
       <p:sp>
         <p:nvSpPr>
-          <p:cNvPr id="180" name="Google Shape;180;p20"/>
+          <p:cNvPr id="173" name="Google Shape;173;p20"/>
           <p:cNvSpPr txBox="1"/>
           <p:nvPr/>
         </p:nvSpPr>
@@ -13187,7 +13362,7 @@
       </p:sp>
       <p:pic>
         <p:nvPicPr>
-          <p:cNvPr id="181" name="Google Shape;181;p20"/>
+          <p:cNvPr id="174" name="Google Shape;174;p20"/>
           <p:cNvPicPr preferRelativeResize="0"/>
           <p:nvPr/>
         </p:nvPicPr>
@@ -13215,7 +13390,7 @@
       </p:pic>
       <p:sp>
         <p:nvSpPr>
-          <p:cNvPr id="182" name="Google Shape;182;p20"/>
+          <p:cNvPr id="175" name="Google Shape;175;p20"/>
           <p:cNvSpPr/>
           <p:nvPr/>
         </p:nvSpPr>
@@ -13267,7 +13442,7 @@
       </p:sp>
       <p:pic>
         <p:nvPicPr>
-          <p:cNvPr id="183" name="Google Shape;183;p20"/>
+          <p:cNvPr id="176" name="Google Shape;176;p20"/>
           <p:cNvPicPr preferRelativeResize="0"/>
           <p:nvPr/>
         </p:nvPicPr>
@@ -13293,37 +13468,9 @@
           </a:ln>
         </p:spPr>
       </p:pic>
-      <p:pic>
-        <p:nvPicPr>
-          <p:cNvPr id="184" name="Google Shape;184;p20"/>
-          <p:cNvPicPr preferRelativeResize="0"/>
-          <p:nvPr/>
-        </p:nvPicPr>
-        <p:blipFill>
-          <a:blip r:embed="rId6">
-            <a:alphaModFix/>
-          </a:blip>
-          <a:stretch>
-            <a:fillRect/>
-          </a:stretch>
-        </p:blipFill>
-        <p:spPr>
-          <a:xfrm>
-            <a:off x="3103475" y="3264269"/>
-            <a:ext cx="1802825" cy="1224475"/>
-          </a:xfrm>
-          <a:prstGeom prst="rect">
-            <a:avLst/>
-          </a:prstGeom>
-          <a:noFill/>
-          <a:ln>
-            <a:noFill/>
-          </a:ln>
-        </p:spPr>
-      </p:pic>
       <p:sp>
         <p:nvSpPr>
-          <p:cNvPr id="185" name="Google Shape;185;p20"/>
+          <p:cNvPr id="177" name="Google Shape;177;p20"/>
           <p:cNvSpPr/>
           <p:nvPr/>
         </p:nvSpPr>
@@ -13375,12 +13522,12 @@
       </p:sp>
       <p:pic>
         <p:nvPicPr>
-          <p:cNvPr id="186" name="Google Shape;186;p20"/>
+          <p:cNvPr id="178" name="Google Shape;178;p20"/>
           <p:cNvPicPr preferRelativeResize="0"/>
           <p:nvPr/>
         </p:nvPicPr>
         <p:blipFill>
-          <a:blip r:embed="rId7">
+          <a:blip r:embed="rId6">
             <a:alphaModFix/>
           </a:blip>
           <a:stretch>
@@ -13389,35 +13536,7 @@
         </p:blipFill>
         <p:spPr>
           <a:xfrm>
-            <a:off x="5880425" y="3325100"/>
-            <a:ext cx="1685275" cy="1146325"/>
-          </a:xfrm>
-          <a:prstGeom prst="rect">
-            <a:avLst/>
-          </a:prstGeom>
-          <a:noFill/>
-          <a:ln>
-            <a:noFill/>
-          </a:ln>
-        </p:spPr>
-      </p:pic>
-      <p:pic>
-        <p:nvPicPr>
-          <p:cNvPr id="187" name="Google Shape;187;p20"/>
-          <p:cNvPicPr preferRelativeResize="0"/>
-          <p:nvPr/>
-        </p:nvPicPr>
-        <p:blipFill>
-          <a:blip r:embed="rId8">
-            <a:alphaModFix/>
-          </a:blip>
-          <a:stretch>
-            <a:fillRect/>
-          </a:stretch>
-        </p:blipFill>
-        <p:spPr>
-          <a:xfrm>
-            <a:off x="2962111" y="3193275"/>
+            <a:off x="3041123" y="3070375"/>
             <a:ext cx="1609889" cy="1580350"/>
           </a:xfrm>
           <a:prstGeom prst="rect">
@@ -13434,6 +13553,62 @@
               </a:srgbClr>
             </a:outerShdw>
           </a:effectLst>
+        </p:spPr>
+      </p:pic>
+      <p:pic>
+        <p:nvPicPr>
+          <p:cNvPr id="179" name="Google Shape;179;p20"/>
+          <p:cNvPicPr preferRelativeResize="0"/>
+          <p:nvPr/>
+        </p:nvPicPr>
+        <p:blipFill>
+          <a:blip r:embed="rId7">
+            <a:alphaModFix/>
+          </a:blip>
+          <a:stretch>
+            <a:fillRect/>
+          </a:stretch>
+        </p:blipFill>
+        <p:spPr>
+          <a:xfrm>
+            <a:off x="2838403" y="3193275"/>
+            <a:ext cx="2015326" cy="1380500"/>
+          </a:xfrm>
+          <a:prstGeom prst="rect">
+            <a:avLst/>
+          </a:prstGeom>
+          <a:noFill/>
+          <a:ln>
+            <a:noFill/>
+          </a:ln>
+        </p:spPr>
+      </p:pic>
+      <p:pic>
+        <p:nvPicPr>
+          <p:cNvPr id="180" name="Google Shape;180;p20"/>
+          <p:cNvPicPr preferRelativeResize="0"/>
+          <p:nvPr/>
+        </p:nvPicPr>
+        <p:blipFill>
+          <a:blip r:embed="rId8">
+            <a:alphaModFix/>
+          </a:blip>
+          <a:stretch>
+            <a:fillRect/>
+          </a:stretch>
+        </p:blipFill>
+        <p:spPr>
+          <a:xfrm>
+            <a:off x="5831546" y="3193962"/>
+            <a:ext cx="2011680" cy="1380744"/>
+          </a:xfrm>
+          <a:prstGeom prst="rect">
+            <a:avLst/>
+          </a:prstGeom>
+          <a:noFill/>
+          <a:ln>
+            <a:noFill/>
+          </a:ln>
         </p:spPr>
       </p:pic>
     </p:spTree>
@@ -13475,7 +13650,7 @@
                                           </p:stCondLst>
                                         </p:cTn>
                                         <p:tgtEl>
-                                          <p:spTgt spid="177"/>
+                                          <p:spTgt spid="170"/>
                                         </p:tgtEl>
                                         <p:attrNameLst>
                                           <p:attrName>style.visibility</p:attrName>
@@ -13489,7 +13664,201 @@
                                       <p:cBhvr>
                                         <p:cTn dur="1000"/>
                                         <p:tgtEl>
-                                          <p:spTgt spid="177"/>
+                                          <p:spTgt spid="170"/>
+                                        </p:tgtEl>
+                                      </p:cBhvr>
+                                    </p:animEffect>
+                                  </p:childTnLst>
+                                </p:cTn>
+                              </p:par>
+                            </p:childTnLst>
+                          </p:cTn>
+                        </p:par>
+                      </p:childTnLst>
+                    </p:cTn>
+                  </p:par>
+                  <p:par>
+                    <p:cTn fill="hold">
+                      <p:stCondLst>
+                        <p:cond delay="indefinite"/>
+                      </p:stCondLst>
+                      <p:childTnLst>
+                        <p:par>
+                          <p:cTn fill="hold">
+                            <p:stCondLst>
+                              <p:cond delay="0"/>
+                            </p:stCondLst>
+                            <p:childTnLst>
+                              <p:par>
+                                <p:cTn fill="hold" nodeType="clickEffect" presetClass="entr" presetID="10" presetSubtype="0">
+                                  <p:stCondLst>
+                                    <p:cond delay="0"/>
+                                  </p:stCondLst>
+                                  <p:childTnLst>
+                                    <p:set>
+                                      <p:cBhvr>
+                                        <p:cTn dur="1" fill="hold">
+                                          <p:stCondLst>
+                                            <p:cond delay="0"/>
+                                          </p:stCondLst>
+                                        </p:cTn>
+                                        <p:tgtEl>
+                                          <p:spTgt spid="169"/>
+                                        </p:tgtEl>
+                                        <p:attrNameLst>
+                                          <p:attrName>style.visibility</p:attrName>
+                                        </p:attrNameLst>
+                                      </p:cBhvr>
+                                      <p:to>
+                                        <p:strVal val="visible"/>
+                                      </p:to>
+                                    </p:set>
+                                    <p:animEffect filter="fade" transition="in">
+                                      <p:cBhvr>
+                                        <p:cTn dur="1000"/>
+                                        <p:tgtEl>
+                                          <p:spTgt spid="169"/>
+                                        </p:tgtEl>
+                                      </p:cBhvr>
+                                    </p:animEffect>
+                                  </p:childTnLst>
+                                </p:cTn>
+                              </p:par>
+                            </p:childTnLst>
+                          </p:cTn>
+                        </p:par>
+                      </p:childTnLst>
+                    </p:cTn>
+                  </p:par>
+                  <p:par>
+                    <p:cTn fill="hold">
+                      <p:stCondLst>
+                        <p:cond delay="indefinite"/>
+                      </p:stCondLst>
+                      <p:childTnLst>
+                        <p:par>
+                          <p:cTn fill="hold">
+                            <p:stCondLst>
+                              <p:cond delay="0"/>
+                            </p:stCondLst>
+                            <p:childTnLst>
+                              <p:par>
+                                <p:cTn fill="hold" nodeType="clickEffect" presetClass="entr" presetID="10" presetSubtype="0">
+                                  <p:stCondLst>
+                                    <p:cond delay="0"/>
+                                  </p:stCondLst>
+                                  <p:childTnLst>
+                                    <p:set>
+                                      <p:cBhvr>
+                                        <p:cTn dur="1" fill="hold">
+                                          <p:stCondLst>
+                                            <p:cond delay="0"/>
+                                          </p:stCondLst>
+                                        </p:cTn>
+                                        <p:tgtEl>
+                                          <p:spTgt spid="171"/>
+                                        </p:tgtEl>
+                                        <p:attrNameLst>
+                                          <p:attrName>style.visibility</p:attrName>
+                                        </p:attrNameLst>
+                                      </p:cBhvr>
+                                      <p:to>
+                                        <p:strVal val="visible"/>
+                                      </p:to>
+                                    </p:set>
+                                    <p:animEffect filter="fade" transition="in">
+                                      <p:cBhvr>
+                                        <p:cTn dur="1000"/>
+                                        <p:tgtEl>
+                                          <p:spTgt spid="171"/>
+                                        </p:tgtEl>
+                                      </p:cBhvr>
+                                    </p:animEffect>
+                                  </p:childTnLst>
+                                </p:cTn>
+                              </p:par>
+                              <p:par>
+                                <p:cTn fill="hold" nodeType="withEffect" presetClass="entr" presetID="10" presetSubtype="0">
+                                  <p:stCondLst>
+                                    <p:cond delay="0"/>
+                                  </p:stCondLst>
+                                  <p:childTnLst>
+                                    <p:set>
+                                      <p:cBhvr>
+                                        <p:cTn dur="1" fill="hold">
+                                          <p:stCondLst>
+                                            <p:cond delay="0"/>
+                                          </p:stCondLst>
+                                        </p:cTn>
+                                        <p:tgtEl>
+                                          <p:spTgt spid="174"/>
+                                        </p:tgtEl>
+                                        <p:attrNameLst>
+                                          <p:attrName>style.visibility</p:attrName>
+                                        </p:attrNameLst>
+                                      </p:cBhvr>
+                                      <p:to>
+                                        <p:strVal val="visible"/>
+                                      </p:to>
+                                    </p:set>
+                                    <p:animEffect filter="fade" transition="in">
+                                      <p:cBhvr>
+                                        <p:cTn dur="1000"/>
+                                        <p:tgtEl>
+                                          <p:spTgt spid="174"/>
+                                        </p:tgtEl>
+                                      </p:cBhvr>
+                                    </p:animEffect>
+                                  </p:childTnLst>
+                                </p:cTn>
+                              </p:par>
+                            </p:childTnLst>
+                          </p:cTn>
+                        </p:par>
+                      </p:childTnLst>
+                    </p:cTn>
+                  </p:par>
+                  <p:par>
+                    <p:cTn fill="hold">
+                      <p:stCondLst>
+                        <p:cond delay="indefinite"/>
+                      </p:stCondLst>
+                      <p:childTnLst>
+                        <p:par>
+                          <p:cTn fill="hold">
+                            <p:stCondLst>
+                              <p:cond delay="0"/>
+                            </p:stCondLst>
+                            <p:childTnLst>
+                              <p:par>
+                                <p:cTn fill="hold" nodeType="clickEffect" presetClass="entr" presetID="10" presetSubtype="0">
+                                  <p:stCondLst>
+                                    <p:cond delay="0"/>
+                                  </p:stCondLst>
+                                  <p:childTnLst>
+                                    <p:set>
+                                      <p:cBhvr>
+                                        <p:cTn dur="1" fill="hold">
+                                          <p:stCondLst>
+                                            <p:cond delay="0"/>
+                                          </p:stCondLst>
+                                        </p:cTn>
+                                        <p:tgtEl>
+                                          <p:spTgt spid="175"/>
+                                        </p:tgtEl>
+                                        <p:attrNameLst>
+                                          <p:attrName>style.visibility</p:attrName>
+                                        </p:attrNameLst>
+                                      </p:cBhvr>
+                                      <p:to>
+                                        <p:strVal val="visible"/>
+                                      </p:to>
+                                    </p:set>
+                                    <p:animEffect filter="fade" transition="in">
+                                      <p:cBhvr>
+                                        <p:cTn dur="1000"/>
+                                        <p:tgtEl>
+                                          <p:spTgt spid="175"/>
                                         </p:tgtEl>
                                       </p:cBhvr>
                                     </p:animEffect>
@@ -13581,7 +13950,7 @@
                                           </p:stCondLst>
                                         </p:cTn>
                                         <p:tgtEl>
-                                          <p:spTgt spid="178"/>
+                                          <p:spTgt spid="172"/>
                                         </p:tgtEl>
                                         <p:attrNameLst>
                                           <p:attrName>style.visibility</p:attrName>
@@ -13595,7 +13964,7 @@
                                       <p:cBhvr>
                                         <p:cTn dur="1000"/>
                                         <p:tgtEl>
-                                          <p:spTgt spid="178"/>
+                                          <p:spTgt spid="172"/>
                                         </p:tgtEl>
                                       </p:cBhvr>
                                     </p:animEffect>
@@ -13603,7 +13972,7 @@
                                 </p:cTn>
                               </p:par>
                               <p:par>
-                                <p:cTn fill="hold" nodeType="withEffect" presetClass="entr" presetID="10" presetSubtype="0">
+                                <p:cTn fill="hold" nodeType="withEffect" presetClass="exit" presetID="1" presetSubtype="0">
                                   <p:stCondLst>
                                     <p:cond delay="0"/>
                                   </p:stCondLst>
@@ -13612,51 +13981,25 @@
                                       <p:cBhvr>
                                         <p:cTn dur="1" fill="hold">
                                           <p:stCondLst>
-                                            <p:cond delay="0"/>
+                                            <p:cond delay="100"/>
                                           </p:stCondLst>
                                         </p:cTn>
                                         <p:tgtEl>
-                                          <p:spTgt spid="181"/>
+                                          <p:spTgt spid="174"/>
                                         </p:tgtEl>
                                         <p:attrNameLst>
                                           <p:attrName>style.visibility</p:attrName>
                                         </p:attrNameLst>
                                       </p:cBhvr>
                                       <p:to>
-                                        <p:strVal val="visible"/>
+                                        <p:strVal val="hidden"/>
                                       </p:to>
                                     </p:set>
-                                    <p:animEffect filter="fade" transition="in">
-                                      <p:cBhvr>
-                                        <p:cTn dur="1000"/>
-                                        <p:tgtEl>
-                                          <p:spTgt spid="181"/>
-                                        </p:tgtEl>
-                                      </p:cBhvr>
-                                    </p:animEffect>
                                   </p:childTnLst>
                                 </p:cTn>
                               </p:par>
-                            </p:childTnLst>
-                          </p:cTn>
-                        </p:par>
-                      </p:childTnLst>
-                    </p:cTn>
-                  </p:par>
-                  <p:par>
-                    <p:cTn fill="hold">
-                      <p:stCondLst>
-                        <p:cond delay="indefinite"/>
-                      </p:stCondLst>
-                      <p:childTnLst>
-                        <p:par>
-                          <p:cTn fill="hold">
-                            <p:stCondLst>
-                              <p:cond delay="0"/>
-                            </p:stCondLst>
-                            <p:childTnLst>
                               <p:par>
-                                <p:cTn fill="hold" nodeType="clickEffect" presetClass="entr" presetID="10" presetSubtype="0">
+                                <p:cTn fill="hold" nodeType="withEffect" presetClass="exit" presetID="1" presetSubtype="0">
                                   <p:stCondLst>
                                     <p:cond delay="0"/>
                                   </p:stCondLst>
@@ -13665,51 +14008,25 @@
                                       <p:cBhvr>
                                         <p:cTn dur="1" fill="hold">
                                           <p:stCondLst>
-                                            <p:cond delay="0"/>
+                                            <p:cond delay="100"/>
                                           </p:stCondLst>
                                         </p:cTn>
                                         <p:tgtEl>
-                                          <p:spTgt spid="182"/>
+                                          <p:spTgt spid="175"/>
                                         </p:tgtEl>
                                         <p:attrNameLst>
                                           <p:attrName>style.visibility</p:attrName>
                                         </p:attrNameLst>
                                       </p:cBhvr>
                                       <p:to>
-                                        <p:strVal val="visible"/>
+                                        <p:strVal val="hidden"/>
                                       </p:to>
                                     </p:set>
-                                    <p:animEffect filter="fade" transition="in">
-                                      <p:cBhvr>
-                                        <p:cTn dur="1000"/>
-                                        <p:tgtEl>
-                                          <p:spTgt spid="182"/>
-                                        </p:tgtEl>
-                                      </p:cBhvr>
-                                    </p:animEffect>
                                   </p:childTnLst>
                                 </p:cTn>
                               </p:par>
-                            </p:childTnLst>
-                          </p:cTn>
-                        </p:par>
-                      </p:childTnLst>
-                    </p:cTn>
-                  </p:par>
-                  <p:par>
-                    <p:cTn fill="hold">
-                      <p:stCondLst>
-                        <p:cond delay="indefinite"/>
-                      </p:stCondLst>
-                      <p:childTnLst>
-                        <p:par>
-                          <p:cTn fill="hold">
-                            <p:stCondLst>
-                              <p:cond delay="0"/>
-                            </p:stCondLst>
-                            <p:childTnLst>
                               <p:par>
-                                <p:cTn fill="hold" nodeType="clickEffect" presetClass="entr" presetID="10" presetSubtype="0">
+                                <p:cTn fill="hold" nodeType="withEffect" presetClass="exit" presetID="1" presetSubtype="0">
                                   <p:stCondLst>
                                     <p:cond delay="0"/>
                                   </p:stCondLst>
@@ -13718,28 +14035,74 @@
                                       <p:cBhvr>
                                         <p:cTn dur="1" fill="hold">
                                           <p:stCondLst>
-                                            <p:cond delay="0"/>
+                                            <p:cond delay="100"/>
                                           </p:stCondLst>
                                         </p:cTn>
                                         <p:tgtEl>
-                                          <p:spTgt spid="183"/>
+                                          <p:spTgt spid="176"/>
                                         </p:tgtEl>
                                         <p:attrNameLst>
                                           <p:attrName>style.visibility</p:attrName>
                                         </p:attrNameLst>
                                       </p:cBhvr>
                                       <p:to>
-                                        <p:strVal val="visible"/>
+                                        <p:strVal val="hidden"/>
                                       </p:to>
                                     </p:set>
-                                    <p:animEffect filter="fade" transition="in">
+                                  </p:childTnLst>
+                                </p:cTn>
+                              </p:par>
+                              <p:par>
+                                <p:cTn fill="hold" nodeType="withEffect" presetClass="exit" presetID="1" presetSubtype="0">
+                                  <p:stCondLst>
+                                    <p:cond delay="0"/>
+                                  </p:stCondLst>
+                                  <p:childTnLst>
+                                    <p:set>
                                       <p:cBhvr>
-                                        <p:cTn dur="1000"/>
+                                        <p:cTn dur="1" fill="hold">
+                                          <p:stCondLst>
+                                            <p:cond delay="100"/>
+                                          </p:stCondLst>
+                                        </p:cTn>
                                         <p:tgtEl>
-                                          <p:spTgt spid="183"/>
+                                          <p:spTgt spid="175"/>
                                         </p:tgtEl>
+                                        <p:attrNameLst>
+                                          <p:attrName>style.visibility</p:attrName>
+                                        </p:attrNameLst>
                                       </p:cBhvr>
-                                    </p:animEffect>
+                                      <p:to>
+                                        <p:strVal val="hidden"/>
+                                      </p:to>
+                                    </p:set>
+                                  </p:childTnLst>
+                                </p:cTn>
+                              </p:par>
+                              <p:par>
+                                <p:cTn fill="hold" nodeType="withEffect" presetClass="exit" presetID="1" presetSubtype="0">
+                                  <p:stCondLst>
+                                    <p:cond delay="0"/>
+                                  </p:stCondLst>
+                                  <p:childTnLst>
+                                    <p:set>
+                                      <p:cBhvr>
+                                        <p:cTn dur="1" fill="hold">
+                                          <p:stCondLst>
+                                            <p:cond delay="100"/>
+                                          </p:stCondLst>
+                                        </p:cTn>
+                                        <p:tgtEl>
+                                          <p:spTgt spid="176"/>
+                                        </p:tgtEl>
+                                        <p:attrNameLst>
+                                          <p:attrName>style.visibility</p:attrName>
+                                        </p:attrNameLst>
+                                      </p:cBhvr>
+                                      <p:to>
+                                        <p:strVal val="hidden"/>
+                                      </p:to>
+                                    </p:set>
                                   </p:childTnLst>
                                 </p:cTn>
                               </p:par>
@@ -13796,141 +14159,6 @@
                                   </p:childTnLst>
                                 </p:cTn>
                               </p:par>
-                              <p:par>
-                                <p:cTn fill="hold" nodeType="withEffect" presetClass="exit" presetID="1" presetSubtype="0">
-                                  <p:stCondLst>
-                                    <p:cond delay="0"/>
-                                  </p:stCondLst>
-                                  <p:childTnLst>
-                                    <p:set>
-                                      <p:cBhvr>
-                                        <p:cTn dur="1" fill="hold">
-                                          <p:stCondLst>
-                                            <p:cond delay="100"/>
-                                          </p:stCondLst>
-                                        </p:cTn>
-                                        <p:tgtEl>
-                                          <p:spTgt spid="181"/>
-                                        </p:tgtEl>
-                                        <p:attrNameLst>
-                                          <p:attrName>style.visibility</p:attrName>
-                                        </p:attrNameLst>
-                                      </p:cBhvr>
-                                      <p:to>
-                                        <p:strVal val="hidden"/>
-                                      </p:to>
-                                    </p:set>
-                                  </p:childTnLst>
-                                </p:cTn>
-                              </p:par>
-                              <p:par>
-                                <p:cTn fill="hold" nodeType="withEffect" presetClass="exit" presetID="1" presetSubtype="0">
-                                  <p:stCondLst>
-                                    <p:cond delay="0"/>
-                                  </p:stCondLst>
-                                  <p:childTnLst>
-                                    <p:set>
-                                      <p:cBhvr>
-                                        <p:cTn dur="1" fill="hold">
-                                          <p:stCondLst>
-                                            <p:cond delay="100"/>
-                                          </p:stCondLst>
-                                        </p:cTn>
-                                        <p:tgtEl>
-                                          <p:spTgt spid="182"/>
-                                        </p:tgtEl>
-                                        <p:attrNameLst>
-                                          <p:attrName>style.visibility</p:attrName>
-                                        </p:attrNameLst>
-                                      </p:cBhvr>
-                                      <p:to>
-                                        <p:strVal val="hidden"/>
-                                      </p:to>
-                                    </p:set>
-                                  </p:childTnLst>
-                                </p:cTn>
-                              </p:par>
-                              <p:par>
-                                <p:cTn fill="hold" nodeType="withEffect" presetClass="exit" presetID="1" presetSubtype="0">
-                                  <p:stCondLst>
-                                    <p:cond delay="0"/>
-                                  </p:stCondLst>
-                                  <p:childTnLst>
-                                    <p:set>
-                                      <p:cBhvr>
-                                        <p:cTn dur="1" fill="hold">
-                                          <p:stCondLst>
-                                            <p:cond delay="100"/>
-                                          </p:stCondLst>
-                                        </p:cTn>
-                                        <p:tgtEl>
-                                          <p:spTgt spid="183"/>
-                                        </p:tgtEl>
-                                        <p:attrNameLst>
-                                          <p:attrName>style.visibility</p:attrName>
-                                        </p:attrNameLst>
-                                      </p:cBhvr>
-                                      <p:to>
-                                        <p:strVal val="hidden"/>
-                                      </p:to>
-                                    </p:set>
-                                  </p:childTnLst>
-                                </p:cTn>
-                              </p:par>
-                              <p:par>
-                                <p:cTn fill="hold" nodeType="withEffect" presetClass="exit" presetID="1" presetSubtype="0">
-                                  <p:stCondLst>
-                                    <p:cond delay="0"/>
-                                  </p:stCondLst>
-                                  <p:childTnLst>
-                                    <p:set>
-                                      <p:cBhvr>
-                                        <p:cTn dur="1" fill="hold">
-                                          <p:stCondLst>
-                                            <p:cond delay="100"/>
-                                          </p:stCondLst>
-                                        </p:cTn>
-                                        <p:tgtEl>
-                                          <p:spTgt spid="182"/>
-                                        </p:tgtEl>
-                                        <p:attrNameLst>
-                                          <p:attrName>style.visibility</p:attrName>
-                                        </p:attrNameLst>
-                                      </p:cBhvr>
-                                      <p:to>
-                                        <p:strVal val="hidden"/>
-                                      </p:to>
-                                    </p:set>
-                                  </p:childTnLst>
-                                </p:cTn>
-                              </p:par>
-                              <p:par>
-                                <p:cTn fill="hold" nodeType="withEffect" presetClass="exit" presetID="1" presetSubtype="0">
-                                  <p:stCondLst>
-                                    <p:cond delay="0"/>
-                                  </p:stCondLst>
-                                  <p:childTnLst>
-                                    <p:set>
-                                      <p:cBhvr>
-                                        <p:cTn dur="1" fill="hold">
-                                          <p:stCondLst>
-                                            <p:cond delay="100"/>
-                                          </p:stCondLst>
-                                        </p:cTn>
-                                        <p:tgtEl>
-                                          <p:spTgt spid="183"/>
-                                        </p:tgtEl>
-                                        <p:attrNameLst>
-                                          <p:attrName>style.visibility</p:attrName>
-                                        </p:attrNameLst>
-                                      </p:cBhvr>
-                                      <p:to>
-                                        <p:strVal val="hidden"/>
-                                      </p:to>
-                                    </p:set>
-                                  </p:childTnLst>
-                                </p:cTn>
-                              </p:par>
                             </p:childTnLst>
                           </p:cTn>
                         </p:par>
@@ -13963,7 +14191,7 @@
                                           </p:stCondLst>
                                         </p:cTn>
                                         <p:tgtEl>
-                                          <p:spTgt spid="184"/>
+                                          <p:spTgt spid="177"/>
                                         </p:tgtEl>
                                         <p:attrNameLst>
                                           <p:attrName>style.visibility</p:attrName>
@@ -13977,113 +14205,7 @@
                                       <p:cBhvr>
                                         <p:cTn dur="1000"/>
                                         <p:tgtEl>
-                                          <p:spTgt spid="184"/>
-                                        </p:tgtEl>
-                                      </p:cBhvr>
-                                    </p:animEffect>
-                                  </p:childTnLst>
-                                </p:cTn>
-                              </p:par>
-                            </p:childTnLst>
-                          </p:cTn>
-                        </p:par>
-                      </p:childTnLst>
-                    </p:cTn>
-                  </p:par>
-                  <p:par>
-                    <p:cTn fill="hold">
-                      <p:stCondLst>
-                        <p:cond delay="indefinite"/>
-                      </p:stCondLst>
-                      <p:childTnLst>
-                        <p:par>
-                          <p:cTn fill="hold">
-                            <p:stCondLst>
-                              <p:cond delay="0"/>
-                            </p:stCondLst>
-                            <p:childTnLst>
-                              <p:par>
-                                <p:cTn fill="hold" nodeType="clickEffect" presetClass="entr" presetID="10" presetSubtype="0">
-                                  <p:stCondLst>
-                                    <p:cond delay="0"/>
-                                  </p:stCondLst>
-                                  <p:childTnLst>
-                                    <p:set>
-                                      <p:cBhvr>
-                                        <p:cTn dur="1" fill="hold">
-                                          <p:stCondLst>
-                                            <p:cond delay="0"/>
-                                          </p:stCondLst>
-                                        </p:cTn>
-                                        <p:tgtEl>
-                                          <p:spTgt spid="185"/>
-                                        </p:tgtEl>
-                                        <p:attrNameLst>
-                                          <p:attrName>style.visibility</p:attrName>
-                                        </p:attrNameLst>
-                                      </p:cBhvr>
-                                      <p:to>
-                                        <p:strVal val="visible"/>
-                                      </p:to>
-                                    </p:set>
-                                    <p:animEffect filter="fade" transition="in">
-                                      <p:cBhvr>
-                                        <p:cTn dur="1000"/>
-                                        <p:tgtEl>
-                                          <p:spTgt spid="185"/>
-                                        </p:tgtEl>
-                                      </p:cBhvr>
-                                    </p:animEffect>
-                                  </p:childTnLst>
-                                </p:cTn>
-                              </p:par>
-                            </p:childTnLst>
-                          </p:cTn>
-                        </p:par>
-                      </p:childTnLst>
-                    </p:cTn>
-                  </p:par>
-                  <p:par>
-                    <p:cTn fill="hold">
-                      <p:stCondLst>
-                        <p:cond delay="indefinite"/>
-                      </p:stCondLst>
-                      <p:childTnLst>
-                        <p:par>
-                          <p:cTn fill="hold">
-                            <p:stCondLst>
-                              <p:cond delay="0"/>
-                            </p:stCondLst>
-                            <p:childTnLst>
-                              <p:par>
-                                <p:cTn fill="hold" nodeType="clickEffect" presetClass="entr" presetID="10" presetSubtype="0">
-                                  <p:stCondLst>
-                                    <p:cond delay="0"/>
-                                  </p:stCondLst>
-                                  <p:childTnLst>
-                                    <p:set>
-                                      <p:cBhvr>
-                                        <p:cTn dur="1" fill="hold">
-                                          <p:stCondLst>
-                                            <p:cond delay="0"/>
-                                          </p:stCondLst>
-                                        </p:cTn>
-                                        <p:tgtEl>
-                                          <p:spTgt spid="186"/>
-                                        </p:tgtEl>
-                                        <p:attrNameLst>
-                                          <p:attrName>style.visibility</p:attrName>
-                                        </p:attrNameLst>
-                                      </p:cBhvr>
-                                      <p:to>
-                                        <p:strVal val="visible"/>
-                                      </p:to>
-                                    </p:set>
-                                    <p:animEffect filter="fade" transition="in">
-                                      <p:cBhvr>
-                                        <p:cTn dur="1000"/>
-                                        <p:tgtEl>
-                                          <p:spTgt spid="186"/>
+                                          <p:spTgt spid="177"/>
                                         </p:tgtEl>
                                       </p:cBhvr>
                                     </p:animEffect>
@@ -14143,6 +14265,59 @@
                                   </p:childTnLst>
                                 </p:cTn>
                               </p:par>
+                            </p:childTnLst>
+                          </p:cTn>
+                        </p:par>
+                      </p:childTnLst>
+                    </p:cTn>
+                  </p:par>
+                  <p:par>
+                    <p:cTn fill="hold">
+                      <p:stCondLst>
+                        <p:cond delay="indefinite"/>
+                      </p:stCondLst>
+                      <p:childTnLst>
+                        <p:par>
+                          <p:cTn fill="hold">
+                            <p:stCondLst>
+                              <p:cond delay="0"/>
+                            </p:stCondLst>
+                            <p:childTnLst>
+                              <p:par>
+                                <p:cTn fill="hold" nodeType="clickEffect" presetClass="entr" presetID="10" presetSubtype="0">
+                                  <p:stCondLst>
+                                    <p:cond delay="0"/>
+                                  </p:stCondLst>
+                                  <p:childTnLst>
+                                    <p:set>
+                                      <p:cBhvr>
+                                        <p:cTn dur="1" fill="hold">
+                                          <p:stCondLst>
+                                            <p:cond delay="0"/>
+                                          </p:stCondLst>
+                                        </p:cTn>
+                                        <p:tgtEl>
+                                          <p:spTgt spid="173"/>
+                                        </p:tgtEl>
+                                        <p:attrNameLst>
+                                          <p:attrName>style.visibility</p:attrName>
+                                        </p:attrNameLst>
+                                      </p:cBhvr>
+                                      <p:to>
+                                        <p:strVal val="visible"/>
+                                      </p:to>
+                                    </p:set>
+                                    <p:animEffect filter="fade" transition="in">
+                                      <p:cBhvr>
+                                        <p:cTn dur="1000"/>
+                                        <p:tgtEl>
+                                          <p:spTgt spid="173"/>
+                                        </p:tgtEl>
+                                      </p:cBhvr>
+                                    </p:animEffect>
+                                  </p:childTnLst>
+                                </p:cTn>
+                              </p:par>
                               <p:par>
                                 <p:cTn fill="hold" nodeType="withEffect" presetClass="exit" presetID="1" presetSubtype="0">
                                   <p:stCondLst>
@@ -14157,7 +14332,7 @@
                                           </p:stCondLst>
                                         </p:cTn>
                                         <p:tgtEl>
-                                          <p:spTgt spid="184"/>
+                                          <p:spTgt spid="179"/>
                                         </p:tgtEl>
                                         <p:attrNameLst>
                                           <p:attrName>style.visibility</p:attrName>
@@ -14184,7 +14359,7 @@
                                           </p:stCondLst>
                                         </p:cTn>
                                         <p:tgtEl>
-                                          <p:spTgt spid="185"/>
+                                          <p:spTgt spid="177"/>
                                         </p:tgtEl>
                                         <p:attrNameLst>
                                           <p:attrName>style.visibility</p:attrName>
@@ -14211,7 +14386,7 @@
                                           </p:stCondLst>
                                         </p:cTn>
                                         <p:tgtEl>
-                                          <p:spTgt spid="186"/>
+                                          <p:spTgt spid="180"/>
                                         </p:tgtEl>
                                         <p:attrNameLst>
                                           <p:attrName>style.visibility</p:attrName>
@@ -14238,7 +14413,7 @@
                                           </p:stCondLst>
                                         </p:cTn>
                                         <p:tgtEl>
-                                          <p:spTgt spid="187"/>
+                                          <p:spTgt spid="178"/>
                                         </p:tgtEl>
                                         <p:attrNameLst>
                                           <p:attrName>style.visibility</p:attrName>
@@ -14252,7 +14427,7 @@
                                       <p:cBhvr>
                                         <p:cTn dur="1000"/>
                                         <p:tgtEl>
-                                          <p:spTgt spid="187"/>
+                                          <p:spTgt spid="178"/>
                                         </p:tgtEl>
                                       </p:cBhvr>
                                     </p:animEffect>
@@ -14295,7 +14470,7 @@
   <p:cSld>
     <p:spTree>
       <p:nvGrpSpPr>
-        <p:cNvPr id="191" name="Shape 191"/>
+        <p:cNvPr id="184" name="Shape 184"/>
         <p:cNvGrpSpPr/>
         <p:nvPr/>
       </p:nvGrpSpPr>
@@ -14309,7 +14484,7 @@
       </p:grpSpPr>
       <p:sp>
         <p:nvSpPr>
-          <p:cNvPr id="192" name="Google Shape;192;p21"/>
+          <p:cNvPr id="185" name="Google Shape;185;p21"/>
           <p:cNvSpPr/>
           <p:nvPr/>
         </p:nvSpPr>
@@ -14375,7 +14550,7 @@
       </p:sp>
       <p:sp>
         <p:nvSpPr>
-          <p:cNvPr id="193" name="Google Shape;193;p21"/>
+          <p:cNvPr id="186" name="Google Shape;186;p21"/>
           <p:cNvSpPr/>
           <p:nvPr/>
         </p:nvSpPr>
@@ -14433,7 +14608,7 @@
       </p:sp>
       <p:sp>
         <p:nvSpPr>
-          <p:cNvPr id="194" name="Google Shape;194;p21"/>
+          <p:cNvPr id="187" name="Google Shape;187;p21"/>
           <p:cNvSpPr/>
           <p:nvPr/>
         </p:nvSpPr>
@@ -14492,7 +14667,7 @@
       </p:sp>
       <p:sp>
         <p:nvSpPr>
-          <p:cNvPr id="195" name="Google Shape;195;p21"/>
+          <p:cNvPr id="188" name="Google Shape;188;p21"/>
           <p:cNvSpPr/>
           <p:nvPr/>
         </p:nvSpPr>
@@ -14550,7 +14725,7 @@
       </p:sp>
       <p:pic>
         <p:nvPicPr>
-          <p:cNvPr id="196" name="Google Shape;196;p21"/>
+          <p:cNvPr id="189" name="Google Shape;189;p21"/>
           <p:cNvPicPr preferRelativeResize="0"/>
           <p:nvPr/>
         </p:nvPicPr>
@@ -14578,7 +14753,7 @@
       </p:pic>
       <p:sp>
         <p:nvSpPr>
-          <p:cNvPr id="197" name="Google Shape;197;p21"/>
+          <p:cNvPr id="190" name="Google Shape;190;p21"/>
           <p:cNvSpPr txBox="1"/>
           <p:nvPr/>
         </p:nvSpPr>
@@ -14624,7 +14799,7 @@
       </p:sp>
       <p:sp>
         <p:nvSpPr>
-          <p:cNvPr id="198" name="Google Shape;198;p21"/>
+          <p:cNvPr id="191" name="Google Shape;191;p21"/>
           <p:cNvSpPr txBox="1"/>
           <p:nvPr/>
         </p:nvSpPr>
@@ -14670,7 +14845,7 @@
       </p:sp>
       <p:pic>
         <p:nvPicPr>
-          <p:cNvPr id="199" name="Google Shape;199;p21"/>
+          <p:cNvPr id="192" name="Google Shape;192;p21"/>
           <p:cNvPicPr preferRelativeResize="0"/>
           <p:nvPr/>
         </p:nvPicPr>
@@ -14705,7 +14880,7 @@
       </p:pic>
       <p:pic>
         <p:nvPicPr>
-          <p:cNvPr id="200" name="Google Shape;200;p21"/>
+          <p:cNvPr id="193" name="Google Shape;193;p21"/>
           <p:cNvPicPr preferRelativeResize="0"/>
           <p:nvPr/>
         </p:nvPicPr>
@@ -14777,7 +14952,7 @@
                                           </p:stCondLst>
                                         </p:cTn>
                                         <p:tgtEl>
-                                          <p:spTgt spid="197"/>
+                                          <p:spTgt spid="190"/>
                                         </p:tgtEl>
                                         <p:attrNameLst>
                                           <p:attrName>style.visibility</p:attrName>
@@ -14791,7 +14966,7 @@
                                       <p:cBhvr>
                                         <p:cTn dur="1000"/>
                                         <p:tgtEl>
-                                          <p:spTgt spid="197"/>
+                                          <p:spTgt spid="190"/>
                                         </p:tgtEl>
                                       </p:cBhvr>
                                     </p:animEffect>
@@ -14830,7 +15005,7 @@
                                           </p:stCondLst>
                                         </p:cTn>
                                         <p:tgtEl>
-                                          <p:spTgt spid="198"/>
+                                          <p:spTgt spid="191"/>
                                         </p:tgtEl>
                                         <p:attrNameLst>
                                           <p:attrName>style.visibility</p:attrName>
@@ -14844,7 +15019,7 @@
                                       <p:cBhvr>
                                         <p:cTn dur="1000"/>
                                         <p:tgtEl>
-                                          <p:spTgt spid="198"/>
+                                          <p:spTgt spid="191"/>
                                         </p:tgtEl>
                                       </p:cBhvr>
                                     </p:animEffect>
@@ -14883,7 +15058,7 @@
                                           </p:stCondLst>
                                         </p:cTn>
                                         <p:tgtEl>
-                                          <p:spTgt spid="199"/>
+                                          <p:spTgt spid="192"/>
                                         </p:tgtEl>
                                         <p:attrNameLst>
                                           <p:attrName>style.visibility</p:attrName>
@@ -14897,7 +15072,7 @@
                                       <p:cBhvr>
                                         <p:cTn dur="1000"/>
                                         <p:tgtEl>
-                                          <p:spTgt spid="199"/>
+                                          <p:spTgt spid="192"/>
                                         </p:tgtEl>
                                       </p:cBhvr>
                                     </p:animEffect>
@@ -14936,7 +15111,7 @@
                                           </p:stCondLst>
                                         </p:cTn>
                                         <p:tgtEl>
-                                          <p:spTgt spid="200"/>
+                                          <p:spTgt spid="193"/>
                                         </p:tgtEl>
                                         <p:attrNameLst>
                                           <p:attrName>style.visibility</p:attrName>
@@ -14950,7 +15125,7 @@
                                       <p:cBhvr>
                                         <p:cTn dur="1000"/>
                                         <p:tgtEl>
-                                          <p:spTgt spid="200"/>
+                                          <p:spTgt spid="193"/>
                                         </p:tgtEl>
                                       </p:cBhvr>
                                     </p:animEffect>
@@ -14971,7 +15146,7 @@
                                           </p:stCondLst>
                                         </p:cTn>
                                         <p:tgtEl>
-                                          <p:spTgt spid="199"/>
+                                          <p:spTgt spid="192"/>
                                         </p:tgtEl>
                                         <p:attrNameLst>
                                           <p:attrName>style.visibility</p:attrName>

</xml_diff>

<commit_message>
removed copied images for normalization
</commit_message>
<xml_diff>
--- a/public/Exam Notes/1-Introduction - Data Engineering.pptx
+++ b/public/Exam Notes/1-Introduction - Data Engineering.pptx
@@ -13360,37 +13360,9 @@
           </a:p>
         </p:txBody>
       </p:sp>
-      <p:pic>
-        <p:nvPicPr>
-          <p:cNvPr id="174" name="Google Shape;174;p20"/>
-          <p:cNvPicPr preferRelativeResize="0"/>
-          <p:nvPr/>
-        </p:nvPicPr>
-        <p:blipFill>
-          <a:blip r:embed="rId4">
-            <a:alphaModFix/>
-          </a:blip>
-          <a:stretch>
-            <a:fillRect/>
-          </a:stretch>
-        </p:blipFill>
-        <p:spPr>
-          <a:xfrm>
-            <a:off x="3783440" y="3010850"/>
-            <a:ext cx="1186379" cy="1746975"/>
-          </a:xfrm>
-          <a:prstGeom prst="rect">
-            <a:avLst/>
-          </a:prstGeom>
-          <a:noFill/>
-          <a:ln>
-            <a:noFill/>
-          </a:ln>
-        </p:spPr>
-      </p:pic>
       <p:sp>
         <p:nvSpPr>
-          <p:cNvPr id="175" name="Google Shape;175;p20"/>
+          <p:cNvPr id="174" name="Google Shape;174;p20"/>
           <p:cNvSpPr/>
           <p:nvPr/>
         </p:nvSpPr>
@@ -13440,37 +13412,9 @@
           </a:p>
         </p:txBody>
       </p:sp>
-      <p:pic>
-        <p:nvPicPr>
-          <p:cNvPr id="176" name="Google Shape;176;p20"/>
-          <p:cNvPicPr preferRelativeResize="0"/>
-          <p:nvPr/>
-        </p:nvPicPr>
-        <p:blipFill>
-          <a:blip r:embed="rId5">
-            <a:alphaModFix/>
-          </a:blip>
-          <a:stretch>
-            <a:fillRect/>
-          </a:stretch>
-        </p:blipFill>
-        <p:spPr>
-          <a:xfrm>
-            <a:off x="5764315" y="3003800"/>
-            <a:ext cx="1188720" cy="1746504"/>
-          </a:xfrm>
-          <a:prstGeom prst="rect">
-            <a:avLst/>
-          </a:prstGeom>
-          <a:noFill/>
-          <a:ln>
-            <a:noFill/>
-          </a:ln>
-        </p:spPr>
-      </p:pic>
       <p:sp>
         <p:nvSpPr>
-          <p:cNvPr id="177" name="Google Shape;177;p20"/>
+          <p:cNvPr id="175" name="Google Shape;175;p20"/>
           <p:cNvSpPr/>
           <p:nvPr/>
         </p:nvSpPr>
@@ -13522,6 +13466,62 @@
       </p:sp>
       <p:pic>
         <p:nvPicPr>
+          <p:cNvPr id="176" name="Google Shape;176;p20"/>
+          <p:cNvPicPr preferRelativeResize="0"/>
+          <p:nvPr/>
+        </p:nvPicPr>
+        <p:blipFill>
+          <a:blip r:embed="rId4">
+            <a:alphaModFix/>
+          </a:blip>
+          <a:stretch>
+            <a:fillRect/>
+          </a:stretch>
+        </p:blipFill>
+        <p:spPr>
+          <a:xfrm>
+            <a:off x="2838403" y="3193275"/>
+            <a:ext cx="2015326" cy="1380500"/>
+          </a:xfrm>
+          <a:prstGeom prst="rect">
+            <a:avLst/>
+          </a:prstGeom>
+          <a:noFill/>
+          <a:ln>
+            <a:noFill/>
+          </a:ln>
+        </p:spPr>
+      </p:pic>
+      <p:pic>
+        <p:nvPicPr>
+          <p:cNvPr id="177" name="Google Shape;177;p20"/>
+          <p:cNvPicPr preferRelativeResize="0"/>
+          <p:nvPr/>
+        </p:nvPicPr>
+        <p:blipFill>
+          <a:blip r:embed="rId5">
+            <a:alphaModFix/>
+          </a:blip>
+          <a:stretch>
+            <a:fillRect/>
+          </a:stretch>
+        </p:blipFill>
+        <p:spPr>
+          <a:xfrm>
+            <a:off x="5831546" y="3193962"/>
+            <a:ext cx="2011680" cy="1380744"/>
+          </a:xfrm>
+          <a:prstGeom prst="rect">
+            <a:avLst/>
+          </a:prstGeom>
+          <a:noFill/>
+          <a:ln>
+            <a:noFill/>
+          </a:ln>
+        </p:spPr>
+      </p:pic>
+      <p:pic>
+        <p:nvPicPr>
           <p:cNvPr id="178" name="Google Shape;178;p20"/>
           <p:cNvPicPr preferRelativeResize="0"/>
           <p:nvPr/>
@@ -13536,8 +13536,8 @@
         </p:blipFill>
         <p:spPr>
           <a:xfrm>
-            <a:off x="3041123" y="3070375"/>
-            <a:ext cx="1609889" cy="1580350"/>
+            <a:off x="3077750" y="3143245"/>
+            <a:ext cx="1892075" cy="1557850"/>
           </a:xfrm>
           <a:prstGeom prst="rect">
             <a:avLst/>
@@ -13571,8 +13571,8 @@
         </p:blipFill>
         <p:spPr>
           <a:xfrm>
-            <a:off x="2838403" y="3193275"/>
-            <a:ext cx="2015326" cy="1380500"/>
+            <a:off x="2700050" y="3100850"/>
+            <a:ext cx="2202550" cy="1473925"/>
           </a:xfrm>
           <a:prstGeom prst="rect">
             <a:avLst/>
@@ -13599,8 +13599,8 @@
         </p:blipFill>
         <p:spPr>
           <a:xfrm>
-            <a:off x="5831546" y="3193962"/>
-            <a:ext cx="2011680" cy="1380744"/>
+            <a:off x="5831543" y="3100850"/>
+            <a:ext cx="2203704" cy="1472184"/>
           </a:xfrm>
           <a:prstGeom prst="rect">
             <a:avLst/>
@@ -13791,6 +13791,59 @@
                                           </p:stCondLst>
                                         </p:cTn>
                                         <p:tgtEl>
+                                          <p:spTgt spid="179"/>
+                                        </p:tgtEl>
+                                        <p:attrNameLst>
+                                          <p:attrName>style.visibility</p:attrName>
+                                        </p:attrNameLst>
+                                      </p:cBhvr>
+                                      <p:to>
+                                        <p:strVal val="visible"/>
+                                      </p:to>
+                                    </p:set>
+                                    <p:animEffect filter="fade" transition="in">
+                                      <p:cBhvr>
+                                        <p:cTn dur="1000"/>
+                                        <p:tgtEl>
+                                          <p:spTgt spid="179"/>
+                                        </p:tgtEl>
+                                      </p:cBhvr>
+                                    </p:animEffect>
+                                  </p:childTnLst>
+                                </p:cTn>
+                              </p:par>
+                            </p:childTnLst>
+                          </p:cTn>
+                        </p:par>
+                      </p:childTnLst>
+                    </p:cTn>
+                  </p:par>
+                  <p:par>
+                    <p:cTn fill="hold">
+                      <p:stCondLst>
+                        <p:cond delay="indefinite"/>
+                      </p:stCondLst>
+                      <p:childTnLst>
+                        <p:par>
+                          <p:cTn fill="hold">
+                            <p:stCondLst>
+                              <p:cond delay="0"/>
+                            </p:stCondLst>
+                            <p:childTnLst>
+                              <p:par>
+                                <p:cTn fill="hold" nodeType="clickEffect" presetClass="entr" presetID="10" presetSubtype="0">
+                                  <p:stCondLst>
+                                    <p:cond delay="0"/>
+                                  </p:stCondLst>
+                                  <p:childTnLst>
+                                    <p:set>
+                                      <p:cBhvr>
+                                        <p:cTn dur="1" fill="hold">
+                                          <p:stCondLst>
+                                            <p:cond delay="0"/>
+                                          </p:stCondLst>
+                                        </p:cTn>
+                                        <p:tgtEl>
                                           <p:spTgt spid="174"/>
                                         </p:tgtEl>
                                         <p:attrNameLst>
@@ -13844,7 +13897,7 @@
                                           </p:stCondLst>
                                         </p:cTn>
                                         <p:tgtEl>
-                                          <p:spTgt spid="175"/>
+                                          <p:spTgt spid="180"/>
                                         </p:tgtEl>
                                         <p:attrNameLst>
                                           <p:attrName>style.visibility</p:attrName>
@@ -13856,62 +13909,9 @@
                                     </p:set>
                                     <p:animEffect filter="fade" transition="in">
                                       <p:cBhvr>
-                                        <p:cTn dur="1000"/>
+                                        <p:cTn dur="3300"/>
                                         <p:tgtEl>
-                                          <p:spTgt spid="175"/>
-                                        </p:tgtEl>
-                                      </p:cBhvr>
-                                    </p:animEffect>
-                                  </p:childTnLst>
-                                </p:cTn>
-                              </p:par>
-                            </p:childTnLst>
-                          </p:cTn>
-                        </p:par>
-                      </p:childTnLst>
-                    </p:cTn>
-                  </p:par>
-                  <p:par>
-                    <p:cTn fill="hold">
-                      <p:stCondLst>
-                        <p:cond delay="indefinite"/>
-                      </p:stCondLst>
-                      <p:childTnLst>
-                        <p:par>
-                          <p:cTn fill="hold">
-                            <p:stCondLst>
-                              <p:cond delay="0"/>
-                            </p:stCondLst>
-                            <p:childTnLst>
-                              <p:par>
-                                <p:cTn fill="hold" nodeType="clickEffect" presetClass="entr" presetID="10" presetSubtype="0">
-                                  <p:stCondLst>
-                                    <p:cond delay="0"/>
-                                  </p:stCondLst>
-                                  <p:childTnLst>
-                                    <p:set>
-                                      <p:cBhvr>
-                                        <p:cTn dur="1" fill="hold">
-                                          <p:stCondLst>
-                                            <p:cond delay="0"/>
-                                          </p:stCondLst>
-                                        </p:cTn>
-                                        <p:tgtEl>
-                                          <p:spTgt spid="176"/>
-                                        </p:tgtEl>
-                                        <p:attrNameLst>
-                                          <p:attrName>style.visibility</p:attrName>
-                                        </p:attrNameLst>
-                                      </p:cBhvr>
-                                      <p:to>
-                                        <p:strVal val="visible"/>
-                                      </p:to>
-                                    </p:set>
-                                    <p:animEffect filter="fade" transition="in">
-                                      <p:cBhvr>
-                                        <p:cTn dur="1000"/>
-                                        <p:tgtEl>
-                                          <p:spTgt spid="176"/>
+                                          <p:spTgt spid="180"/>
                                         </p:tgtEl>
                                       </p:cBhvr>
                                     </p:animEffect>
@@ -14012,7 +14012,7 @@
                                           </p:stCondLst>
                                         </p:cTn>
                                         <p:tgtEl>
-                                          <p:spTgt spid="175"/>
+                                          <p:spTgt spid="179"/>
                                         </p:tgtEl>
                                         <p:attrNameLst>
                                           <p:attrName>style.visibility</p:attrName>
@@ -14039,7 +14039,7 @@
                                           </p:stCondLst>
                                         </p:cTn>
                                         <p:tgtEl>
-                                          <p:spTgt spid="176"/>
+                                          <p:spTgt spid="180"/>
                                         </p:tgtEl>
                                         <p:attrNameLst>
                                           <p:attrName>style.visibility</p:attrName>
@@ -14066,34 +14066,7 @@
                                           </p:stCondLst>
                                         </p:cTn>
                                         <p:tgtEl>
-                                          <p:spTgt spid="175"/>
-                                        </p:tgtEl>
-                                        <p:attrNameLst>
-                                          <p:attrName>style.visibility</p:attrName>
-                                        </p:attrNameLst>
-                                      </p:cBhvr>
-                                      <p:to>
-                                        <p:strVal val="hidden"/>
-                                      </p:to>
-                                    </p:set>
-                                  </p:childTnLst>
-                                </p:cTn>
-                              </p:par>
-                              <p:par>
-                                <p:cTn fill="hold" nodeType="withEffect" presetClass="exit" presetID="1" presetSubtype="0">
-                                  <p:stCondLst>
-                                    <p:cond delay="0"/>
-                                  </p:stCondLst>
-                                  <p:childTnLst>
-                                    <p:set>
-                                      <p:cBhvr>
-                                        <p:cTn dur="1" fill="hold">
-                                          <p:stCondLst>
-                                            <p:cond delay="100"/>
-                                          </p:stCondLst>
-                                        </p:cTn>
-                                        <p:tgtEl>
-                                          <p:spTgt spid="176"/>
+                                          <p:spTgt spid="174"/>
                                         </p:tgtEl>
                                         <p:attrNameLst>
                                           <p:attrName>style.visibility</p:attrName>
@@ -14138,7 +14111,7 @@
                                           </p:stCondLst>
                                         </p:cTn>
                                         <p:tgtEl>
-                                          <p:spTgt spid="179"/>
+                                          <p:spTgt spid="176"/>
                                         </p:tgtEl>
                                         <p:attrNameLst>
                                           <p:attrName>style.visibility</p:attrName>
@@ -14152,7 +14125,60 @@
                                       <p:cBhvr>
                                         <p:cTn dur="1000"/>
                                         <p:tgtEl>
-                                          <p:spTgt spid="179"/>
+                                          <p:spTgt spid="176"/>
+                                        </p:tgtEl>
+                                      </p:cBhvr>
+                                    </p:animEffect>
+                                  </p:childTnLst>
+                                </p:cTn>
+                              </p:par>
+                            </p:childTnLst>
+                          </p:cTn>
+                        </p:par>
+                      </p:childTnLst>
+                    </p:cTn>
+                  </p:par>
+                  <p:par>
+                    <p:cTn fill="hold">
+                      <p:stCondLst>
+                        <p:cond delay="indefinite"/>
+                      </p:stCondLst>
+                      <p:childTnLst>
+                        <p:par>
+                          <p:cTn fill="hold">
+                            <p:stCondLst>
+                              <p:cond delay="0"/>
+                            </p:stCondLst>
+                            <p:childTnLst>
+                              <p:par>
+                                <p:cTn fill="hold" nodeType="clickEffect" presetClass="entr" presetID="10" presetSubtype="0">
+                                  <p:stCondLst>
+                                    <p:cond delay="0"/>
+                                  </p:stCondLst>
+                                  <p:childTnLst>
+                                    <p:set>
+                                      <p:cBhvr>
+                                        <p:cTn dur="1" fill="hold">
+                                          <p:stCondLst>
+                                            <p:cond delay="0"/>
+                                          </p:stCondLst>
+                                        </p:cTn>
+                                        <p:tgtEl>
+                                          <p:spTgt spid="175"/>
+                                        </p:tgtEl>
+                                        <p:attrNameLst>
+                                          <p:attrName>style.visibility</p:attrName>
+                                        </p:attrNameLst>
+                                      </p:cBhvr>
+                                      <p:to>
+                                        <p:strVal val="visible"/>
+                                      </p:to>
+                                    </p:set>
+                                    <p:animEffect filter="fade" transition="in">
+                                      <p:cBhvr>
+                                        <p:cTn dur="1000"/>
+                                        <p:tgtEl>
+                                          <p:spTgt spid="175"/>
                                         </p:tgtEl>
                                       </p:cBhvr>
                                     </p:animEffect>
@@ -14244,59 +14270,6 @@
                                           </p:stCondLst>
                                         </p:cTn>
                                         <p:tgtEl>
-                                          <p:spTgt spid="180"/>
-                                        </p:tgtEl>
-                                        <p:attrNameLst>
-                                          <p:attrName>style.visibility</p:attrName>
-                                        </p:attrNameLst>
-                                      </p:cBhvr>
-                                      <p:to>
-                                        <p:strVal val="visible"/>
-                                      </p:to>
-                                    </p:set>
-                                    <p:animEffect filter="fade" transition="in">
-                                      <p:cBhvr>
-                                        <p:cTn dur="1000"/>
-                                        <p:tgtEl>
-                                          <p:spTgt spid="180"/>
-                                        </p:tgtEl>
-                                      </p:cBhvr>
-                                    </p:animEffect>
-                                  </p:childTnLst>
-                                </p:cTn>
-                              </p:par>
-                            </p:childTnLst>
-                          </p:cTn>
-                        </p:par>
-                      </p:childTnLst>
-                    </p:cTn>
-                  </p:par>
-                  <p:par>
-                    <p:cTn fill="hold">
-                      <p:stCondLst>
-                        <p:cond delay="indefinite"/>
-                      </p:stCondLst>
-                      <p:childTnLst>
-                        <p:par>
-                          <p:cTn fill="hold">
-                            <p:stCondLst>
-                              <p:cond delay="0"/>
-                            </p:stCondLst>
-                            <p:childTnLst>
-                              <p:par>
-                                <p:cTn fill="hold" nodeType="clickEffect" presetClass="entr" presetID="10" presetSubtype="0">
-                                  <p:stCondLst>
-                                    <p:cond delay="0"/>
-                                  </p:stCondLst>
-                                  <p:childTnLst>
-                                    <p:set>
-                                      <p:cBhvr>
-                                        <p:cTn dur="1" fill="hold">
-                                          <p:stCondLst>
-                                            <p:cond delay="0"/>
-                                          </p:stCondLst>
-                                        </p:cTn>
-                                        <p:tgtEl>
                                           <p:spTgt spid="173"/>
                                         </p:tgtEl>
                                         <p:attrNameLst>
@@ -14319,6 +14292,41 @@
                                 </p:cTn>
                               </p:par>
                               <p:par>
+                                <p:cTn fill="hold" nodeType="withEffect" presetClass="entr" presetID="10" presetSubtype="0">
+                                  <p:stCondLst>
+                                    <p:cond delay="0"/>
+                                  </p:stCondLst>
+                                  <p:childTnLst>
+                                    <p:set>
+                                      <p:cBhvr>
+                                        <p:cTn dur="1" fill="hold">
+                                          <p:stCondLst>
+                                            <p:cond delay="0"/>
+                                          </p:stCondLst>
+                                        </p:cTn>
+                                        <p:tgtEl>
+                                          <p:spTgt spid="178"/>
+                                        </p:tgtEl>
+                                        <p:attrNameLst>
+                                          <p:attrName>style.visibility</p:attrName>
+                                        </p:attrNameLst>
+                                      </p:cBhvr>
+                                      <p:to>
+                                        <p:strVal val="visible"/>
+                                      </p:to>
+                                    </p:set>
+                                    <p:animEffect filter="fade" transition="in">
+                                      <p:cBhvr>
+                                        <p:cTn dur="1000"/>
+                                        <p:tgtEl>
+                                          <p:spTgt spid="178"/>
+                                        </p:tgtEl>
+                                      </p:cBhvr>
+                                    </p:animEffect>
+                                  </p:childTnLst>
+                                </p:cTn>
+                              </p:par>
+                              <p:par>
                                 <p:cTn fill="hold" nodeType="withEffect" presetClass="exit" presetID="1" presetSubtype="0">
                                   <p:stCondLst>
                                     <p:cond delay="0"/>
@@ -14332,7 +14340,34 @@
                                           </p:stCondLst>
                                         </p:cTn>
                                         <p:tgtEl>
-                                          <p:spTgt spid="179"/>
+                                          <p:spTgt spid="176"/>
+                                        </p:tgtEl>
+                                        <p:attrNameLst>
+                                          <p:attrName>style.visibility</p:attrName>
+                                        </p:attrNameLst>
+                                      </p:cBhvr>
+                                      <p:to>
+                                        <p:strVal val="hidden"/>
+                                      </p:to>
+                                    </p:set>
+                                  </p:childTnLst>
+                                </p:cTn>
+                              </p:par>
+                              <p:par>
+                                <p:cTn fill="hold" nodeType="withEffect" presetClass="exit" presetID="1" presetSubtype="0">
+                                  <p:stCondLst>
+                                    <p:cond delay="0"/>
+                                  </p:stCondLst>
+                                  <p:childTnLst>
+                                    <p:set>
+                                      <p:cBhvr>
+                                        <p:cTn dur="1" fill="hold">
+                                          <p:stCondLst>
+                                            <p:cond delay="100"/>
+                                          </p:stCondLst>
+                                        </p:cTn>
+                                        <p:tgtEl>
+                                          <p:spTgt spid="175"/>
                                         </p:tgtEl>
                                         <p:attrNameLst>
                                           <p:attrName>style.visibility</p:attrName>
@@ -14369,68 +14404,6 @@
                                         <p:strVal val="hidden"/>
                                       </p:to>
                                     </p:set>
-                                  </p:childTnLst>
-                                </p:cTn>
-                              </p:par>
-                              <p:par>
-                                <p:cTn fill="hold" nodeType="withEffect" presetClass="exit" presetID="1" presetSubtype="0">
-                                  <p:stCondLst>
-                                    <p:cond delay="0"/>
-                                  </p:stCondLst>
-                                  <p:childTnLst>
-                                    <p:set>
-                                      <p:cBhvr>
-                                        <p:cTn dur="1" fill="hold">
-                                          <p:stCondLst>
-                                            <p:cond delay="100"/>
-                                          </p:stCondLst>
-                                        </p:cTn>
-                                        <p:tgtEl>
-                                          <p:spTgt spid="180"/>
-                                        </p:tgtEl>
-                                        <p:attrNameLst>
-                                          <p:attrName>style.visibility</p:attrName>
-                                        </p:attrNameLst>
-                                      </p:cBhvr>
-                                      <p:to>
-                                        <p:strVal val="hidden"/>
-                                      </p:to>
-                                    </p:set>
-                                  </p:childTnLst>
-                                </p:cTn>
-                              </p:par>
-                              <p:par>
-                                <p:cTn fill="hold" nodeType="withEffect" presetClass="entr" presetID="10" presetSubtype="0">
-                                  <p:stCondLst>
-                                    <p:cond delay="0"/>
-                                  </p:stCondLst>
-                                  <p:childTnLst>
-                                    <p:set>
-                                      <p:cBhvr>
-                                        <p:cTn dur="1" fill="hold">
-                                          <p:stCondLst>
-                                            <p:cond delay="0"/>
-                                          </p:stCondLst>
-                                        </p:cTn>
-                                        <p:tgtEl>
-                                          <p:spTgt spid="178"/>
-                                        </p:tgtEl>
-                                        <p:attrNameLst>
-                                          <p:attrName>style.visibility</p:attrName>
-                                        </p:attrNameLst>
-                                      </p:cBhvr>
-                                      <p:to>
-                                        <p:strVal val="visible"/>
-                                      </p:to>
-                                    </p:set>
-                                    <p:animEffect filter="fade" transition="in">
-                                      <p:cBhvr>
-                                        <p:cTn dur="1000"/>
-                                        <p:tgtEl>
-                                          <p:spTgt spid="178"/>
-                                        </p:tgtEl>
-                                      </p:cBhvr>
-                                    </p:animEffect>
                                   </p:childTnLst>
                                 </p:cTn>
                               </p:par>

</xml_diff>